<commit_message>
Ajout de quelques slides sur le 2nd notebook
</commit_message>
<xml_diff>
--- a/Soutenance.pptx
+++ b/Soutenance.pptx
@@ -5,7 +5,7 @@
     <p:sldMasterId id="2147483648" r:id="rId1"/>
   </p:sldMasterIdLst>
   <p:notesMasterIdLst>
-    <p:notesMasterId r:id="rId13"/>
+    <p:notesMasterId r:id="rId16"/>
   </p:notesMasterIdLst>
   <p:sldIdLst>
     <p:sldId id="256" r:id="rId2"/>
@@ -19,6 +19,9 @@
     <p:sldId id="264" r:id="rId10"/>
     <p:sldId id="265" r:id="rId11"/>
     <p:sldId id="266" r:id="rId12"/>
+    <p:sldId id="267" r:id="rId13"/>
+    <p:sldId id="268" r:id="rId14"/>
+    <p:sldId id="269" r:id="rId15"/>
   </p:sldIdLst>
   <p:sldSz cx="12192000" cy="6858000"/>
   <p:notesSz cx="6858000" cy="9144000"/>
@@ -207,7 +210,7 @@
           <a:p>
             <a:fld id="{1C4918F8-3781-C942-9B1B-713CC283EA91}" type="datetimeFigureOut">
               <a:rPr lang="fr-FR" smtClean="0"/>
-              <a:t>02/11/2020</a:t>
+              <a:t>03/11/2020</a:t>
             </a:fld>
             <a:endParaRPr lang="fr-FR"/>
           </a:p>
@@ -834,6 +837,523 @@
     <p:extLst>
       <p:ext uri="{BB962C8B-B14F-4D97-AF65-F5344CB8AC3E}">
         <p14:creationId xmlns:p14="http://schemas.microsoft.com/office/powerpoint/2010/main" val="2569388808"/>
+      </p:ext>
+    </p:extLst>
+  </p:cSld>
+  <p:clrMapOvr>
+    <a:masterClrMapping/>
+  </p:clrMapOvr>
+</p:notes>
+</file>
+
+<file path=ppt/notesSlides/notesSlide11.xml><?xml version="1.0" encoding="utf-8"?>
+<p:notes xmlns:a="http://schemas.openxmlformats.org/drawingml/2006/main" xmlns:r="http://schemas.openxmlformats.org/officeDocument/2006/relationships" xmlns:p="http://schemas.openxmlformats.org/presentationml/2006/main">
+  <p:cSld>
+    <p:spTree>
+      <p:nvGrpSpPr>
+        <p:cNvPr id="1" name=""/>
+        <p:cNvGrpSpPr/>
+        <p:nvPr/>
+      </p:nvGrpSpPr>
+      <p:grpSpPr>
+        <a:xfrm>
+          <a:off x="0" y="0"/>
+          <a:ext cx="0" cy="0"/>
+          <a:chOff x="0" y="0"/>
+          <a:chExt cx="0" cy="0"/>
+        </a:xfrm>
+      </p:grpSpPr>
+      <p:sp>
+        <p:nvSpPr>
+          <p:cNvPr id="2" name="Espace réservé de l'image des diapositives 1"/>
+          <p:cNvSpPr>
+            <a:spLocks noGrp="1" noRot="1" noChangeAspect="1"/>
+          </p:cNvSpPr>
+          <p:nvPr>
+            <p:ph type="sldImg"/>
+          </p:nvPr>
+        </p:nvSpPr>
+        <p:spPr/>
+      </p:sp>
+      <p:sp>
+        <p:nvSpPr>
+          <p:cNvPr id="3" name="Espace réservé des notes 2"/>
+          <p:cNvSpPr>
+            <a:spLocks noGrp="1"/>
+          </p:cNvSpPr>
+          <p:nvPr>
+            <p:ph type="body" idx="1"/>
+          </p:nvPr>
+        </p:nvSpPr>
+        <p:spPr/>
+        <p:txBody>
+          <a:bodyPr/>
+          <a:lstStyle/>
+          <a:p>
+            <a:r>
+              <a:rPr lang="fr-FR" dirty="0"/>
+              <a:t>On a la méthode classique, où les maxima de puissance reçue correspondent à des directions bien définies.</a:t>
+            </a:r>
+          </a:p>
+          <a:p>
+            <a:r>
+              <a:rPr lang="fr-FR" dirty="0"/>
+              <a:t>On a ensuite MUSIC, </a:t>
+            </a:r>
+            <a:r>
+              <a:rPr lang="fr-FR" sz="1800" i="1" dirty="0" err="1">
+                <a:effectLst/>
+                <a:latin typeface="Calibri" panose="020F0502020204030204" pitchFamily="34" charset="0"/>
+                <a:ea typeface="Calibri" panose="020F0502020204030204" pitchFamily="34" charset="0"/>
+                <a:cs typeface="Times New Roman" panose="02020603050405020304" pitchFamily="18" charset="0"/>
+              </a:rPr>
+              <a:t>MUltiple</a:t>
+            </a:r>
+            <a:r>
+              <a:rPr lang="fr-FR" sz="1800" i="1" dirty="0">
+                <a:effectLst/>
+                <a:latin typeface="Calibri" panose="020F0502020204030204" pitchFamily="34" charset="0"/>
+                <a:ea typeface="Calibri" panose="020F0502020204030204" pitchFamily="34" charset="0"/>
+                <a:cs typeface="Times New Roman" panose="02020603050405020304" pitchFamily="18" charset="0"/>
+              </a:rPr>
+              <a:t> Signal Classification</a:t>
+            </a:r>
+            <a:r>
+              <a:rPr lang="fr-FR" dirty="0"/>
+              <a:t>, qui est un algorithme robuste au bruit, et qui utilise une décomposition en éléments propre pour séparer le bruit du signal.</a:t>
+            </a:r>
+          </a:p>
+          <a:p>
+            <a:r>
+              <a:rPr lang="fr-FR" dirty="0"/>
+              <a:t>Et enfin CAPON : </a:t>
+            </a:r>
+            <a:r>
+              <a:rPr lang="fr-FR" sz="1800" i="1" dirty="0">
+                <a:effectLst/>
+                <a:latin typeface="Calibri" panose="020F0502020204030204" pitchFamily="34" charset="0"/>
+                <a:ea typeface="Calibri" panose="020F0502020204030204" pitchFamily="34" charset="0"/>
+                <a:cs typeface="Times New Roman" panose="02020603050405020304" pitchFamily="18" charset="0"/>
+              </a:rPr>
+              <a:t>Minimum Variance </a:t>
+            </a:r>
+            <a:r>
+              <a:rPr lang="fr-FR" sz="1800" i="1" dirty="0" err="1">
+                <a:effectLst/>
+                <a:latin typeface="Calibri" panose="020F0502020204030204" pitchFamily="34" charset="0"/>
+                <a:ea typeface="Calibri" panose="020F0502020204030204" pitchFamily="34" charset="0"/>
+                <a:cs typeface="Times New Roman" panose="02020603050405020304" pitchFamily="18" charset="0"/>
+              </a:rPr>
+              <a:t>Distortionless</a:t>
+            </a:r>
+            <a:r>
+              <a:rPr lang="fr-FR" sz="1800" i="1" dirty="0">
+                <a:effectLst/>
+                <a:latin typeface="Calibri" panose="020F0502020204030204" pitchFamily="34" charset="0"/>
+                <a:ea typeface="Calibri" panose="020F0502020204030204" pitchFamily="34" charset="0"/>
+                <a:cs typeface="Times New Roman" panose="02020603050405020304" pitchFamily="18" charset="0"/>
+              </a:rPr>
+              <a:t> </a:t>
+            </a:r>
+            <a:r>
+              <a:rPr lang="fr-FR" sz="1800" i="1" dirty="0" err="1">
+                <a:effectLst/>
+                <a:latin typeface="Calibri" panose="020F0502020204030204" pitchFamily="34" charset="0"/>
+                <a:ea typeface="Calibri" panose="020F0502020204030204" pitchFamily="34" charset="0"/>
+                <a:cs typeface="Times New Roman" panose="02020603050405020304" pitchFamily="18" charset="0"/>
+              </a:rPr>
+              <a:t>Response</a:t>
+            </a:r>
+            <a:r>
+              <a:rPr lang="fr-FR" sz="1800" i="1" dirty="0">
+                <a:effectLst/>
+                <a:latin typeface="Calibri" panose="020F0502020204030204" pitchFamily="34" charset="0"/>
+                <a:ea typeface="Calibri" panose="020F0502020204030204" pitchFamily="34" charset="0"/>
+                <a:cs typeface="Times New Roman" panose="02020603050405020304" pitchFamily="18" charset="0"/>
+              </a:rPr>
+              <a:t>,</a:t>
+            </a:r>
+            <a:r>
+              <a:rPr lang="fr-FR" sz="1800" i="0" dirty="0">
+                <a:effectLst/>
+                <a:latin typeface="Calibri" panose="020F0502020204030204" pitchFamily="34" charset="0"/>
+                <a:ea typeface="Calibri" panose="020F0502020204030204" pitchFamily="34" charset="0"/>
+                <a:cs typeface="Times New Roman" panose="02020603050405020304" pitchFamily="18" charset="0"/>
+              </a:rPr>
+              <a:t> qui assure une détection plus précise que la méthode classique.</a:t>
+            </a:r>
+            <a:br>
+              <a:rPr lang="fr-FR" sz="1800" i="0" dirty="0">
+                <a:effectLst/>
+                <a:latin typeface="Calibri" panose="020F0502020204030204" pitchFamily="34" charset="0"/>
+                <a:ea typeface="Calibri" panose="020F0502020204030204" pitchFamily="34" charset="0"/>
+                <a:cs typeface="Times New Roman" panose="02020603050405020304" pitchFamily="18" charset="0"/>
+              </a:rPr>
+            </a:br>
+            <a:r>
+              <a:rPr lang="fr-FR" sz="1800" i="0" dirty="0">
+                <a:effectLst/>
+                <a:latin typeface="Calibri" panose="020F0502020204030204" pitchFamily="34" charset="0"/>
+                <a:ea typeface="Calibri" panose="020F0502020204030204" pitchFamily="34" charset="0"/>
+                <a:cs typeface="Times New Roman" panose="02020603050405020304" pitchFamily="18" charset="0"/>
+              </a:rPr>
+              <a:t>Du moins, je donne toutes ces propriétés, mais a priori, je ne sais pas si c’est le cas. C’est pour cela que je les ai testées. </a:t>
+            </a:r>
+          </a:p>
+          <a:p>
+            <a:r>
+              <a:rPr lang="fr-FR" sz="1800" i="0" dirty="0">
+                <a:effectLst/>
+                <a:latin typeface="Calibri" panose="020F0502020204030204" pitchFamily="34" charset="0"/>
+                <a:cs typeface="Times New Roman" panose="02020603050405020304" pitchFamily="18" charset="0"/>
+              </a:rPr>
+              <a:t>Commenter les courbes.</a:t>
+            </a:r>
+            <a:endParaRPr lang="fr-FR" i="0" dirty="0"/>
+          </a:p>
+        </p:txBody>
+      </p:sp>
+      <p:sp>
+        <p:nvSpPr>
+          <p:cNvPr id="4" name="Espace réservé du numéro de diapositive 3"/>
+          <p:cNvSpPr>
+            <a:spLocks noGrp="1"/>
+          </p:cNvSpPr>
+          <p:nvPr>
+            <p:ph type="sldNum" sz="quarter" idx="5"/>
+          </p:nvPr>
+        </p:nvSpPr>
+        <p:spPr/>
+        <p:txBody>
+          <a:bodyPr/>
+          <a:lstStyle/>
+          <a:p>
+            <a:fld id="{946D1AFA-ED8B-B94E-B29F-CABEC407D280}" type="slidenum">
+              <a:rPr lang="fr-FR" smtClean="0"/>
+              <a:t>11</a:t>
+            </a:fld>
+            <a:endParaRPr lang="fr-FR"/>
+          </a:p>
+        </p:txBody>
+      </p:sp>
+    </p:spTree>
+    <p:extLst>
+      <p:ext uri="{BB962C8B-B14F-4D97-AF65-F5344CB8AC3E}">
+        <p14:creationId xmlns:p14="http://schemas.microsoft.com/office/powerpoint/2010/main" val="4033218797"/>
+      </p:ext>
+    </p:extLst>
+  </p:cSld>
+  <p:clrMapOvr>
+    <a:masterClrMapping/>
+  </p:clrMapOvr>
+</p:notes>
+</file>
+
+<file path=ppt/notesSlides/notesSlide12.xml><?xml version="1.0" encoding="utf-8"?>
+<p:notes xmlns:a="http://schemas.openxmlformats.org/drawingml/2006/main" xmlns:r="http://schemas.openxmlformats.org/officeDocument/2006/relationships" xmlns:p="http://schemas.openxmlformats.org/presentationml/2006/main">
+  <p:cSld>
+    <p:spTree>
+      <p:nvGrpSpPr>
+        <p:cNvPr id="1" name=""/>
+        <p:cNvGrpSpPr/>
+        <p:nvPr/>
+      </p:nvGrpSpPr>
+      <p:grpSpPr>
+        <a:xfrm>
+          <a:off x="0" y="0"/>
+          <a:ext cx="0" cy="0"/>
+          <a:chOff x="0" y="0"/>
+          <a:chExt cx="0" cy="0"/>
+        </a:xfrm>
+      </p:grpSpPr>
+      <p:sp>
+        <p:nvSpPr>
+          <p:cNvPr id="2" name="Espace réservé de l'image des diapositives 1"/>
+          <p:cNvSpPr>
+            <a:spLocks noGrp="1" noRot="1" noChangeAspect="1"/>
+          </p:cNvSpPr>
+          <p:nvPr>
+            <p:ph type="sldImg"/>
+          </p:nvPr>
+        </p:nvSpPr>
+        <p:spPr/>
+      </p:sp>
+      <p:sp>
+        <p:nvSpPr>
+          <p:cNvPr id="3" name="Espace réservé des notes 2"/>
+          <p:cNvSpPr>
+            <a:spLocks noGrp="1"/>
+          </p:cNvSpPr>
+          <p:nvPr>
+            <p:ph type="body" idx="1"/>
+          </p:nvPr>
+        </p:nvSpPr>
+        <p:spPr/>
+        <p:txBody>
+          <a:bodyPr/>
+          <a:lstStyle/>
+          <a:p>
+            <a:r>
+              <a:rPr lang="fr-FR" dirty="0"/>
+              <a:t>Pour simuler le mouvement, j’ai pris 3 sources fixes, et notre drone qui a un mouvement rectiligne a vitesse constante.</a:t>
+            </a:r>
+          </a:p>
+          <a:p>
+            <a:endParaRPr lang="fr-FR" dirty="0"/>
+          </a:p>
+        </p:txBody>
+      </p:sp>
+      <p:sp>
+        <p:nvSpPr>
+          <p:cNvPr id="4" name="Espace réservé du numéro de diapositive 3"/>
+          <p:cNvSpPr>
+            <a:spLocks noGrp="1"/>
+          </p:cNvSpPr>
+          <p:nvPr>
+            <p:ph type="sldNum" sz="quarter" idx="5"/>
+          </p:nvPr>
+        </p:nvSpPr>
+        <p:spPr/>
+        <p:txBody>
+          <a:bodyPr/>
+          <a:lstStyle/>
+          <a:p>
+            <a:fld id="{946D1AFA-ED8B-B94E-B29F-CABEC407D280}" type="slidenum">
+              <a:rPr lang="fr-FR" smtClean="0"/>
+              <a:t>12</a:t>
+            </a:fld>
+            <a:endParaRPr lang="fr-FR"/>
+          </a:p>
+        </p:txBody>
+      </p:sp>
+    </p:spTree>
+    <p:extLst>
+      <p:ext uri="{BB962C8B-B14F-4D97-AF65-F5344CB8AC3E}">
+        <p14:creationId xmlns:p14="http://schemas.microsoft.com/office/powerpoint/2010/main" val="2668306560"/>
+      </p:ext>
+    </p:extLst>
+  </p:cSld>
+  <p:clrMapOvr>
+    <a:masterClrMapping/>
+  </p:clrMapOvr>
+</p:notes>
+</file>
+
+<file path=ppt/notesSlides/notesSlide13.xml><?xml version="1.0" encoding="utf-8"?>
+<p:notes xmlns:a="http://schemas.openxmlformats.org/drawingml/2006/main" xmlns:r="http://schemas.openxmlformats.org/officeDocument/2006/relationships" xmlns:p="http://schemas.openxmlformats.org/presentationml/2006/main">
+  <p:cSld>
+    <p:spTree>
+      <p:nvGrpSpPr>
+        <p:cNvPr id="1" name=""/>
+        <p:cNvGrpSpPr/>
+        <p:nvPr/>
+      </p:nvGrpSpPr>
+      <p:grpSpPr>
+        <a:xfrm>
+          <a:off x="0" y="0"/>
+          <a:ext cx="0" cy="0"/>
+          <a:chOff x="0" y="0"/>
+          <a:chExt cx="0" cy="0"/>
+        </a:xfrm>
+      </p:grpSpPr>
+      <p:sp>
+        <p:nvSpPr>
+          <p:cNvPr id="2" name="Espace réservé de l'image des diapositives 1"/>
+          <p:cNvSpPr>
+            <a:spLocks noGrp="1" noRot="1" noChangeAspect="1"/>
+          </p:cNvSpPr>
+          <p:nvPr>
+            <p:ph type="sldImg"/>
+          </p:nvPr>
+        </p:nvSpPr>
+        <p:spPr/>
+      </p:sp>
+      <p:sp>
+        <p:nvSpPr>
+          <p:cNvPr id="3" name="Espace réservé des notes 2"/>
+          <p:cNvSpPr>
+            <a:spLocks noGrp="1"/>
+          </p:cNvSpPr>
+          <p:nvPr>
+            <p:ph type="body" idx="1"/>
+          </p:nvPr>
+        </p:nvSpPr>
+        <p:spPr/>
+        <p:txBody>
+          <a:bodyPr/>
+          <a:lstStyle/>
+          <a:p>
+            <a:r>
+              <a:rPr lang="fr-FR" sz="1800" dirty="0">
+                <a:effectLst/>
+                <a:latin typeface="Calibri" panose="020F0502020204030204" pitchFamily="34" charset="0"/>
+                <a:ea typeface="Calibri" panose="020F0502020204030204" pitchFamily="34" charset="0"/>
+                <a:cs typeface="Times New Roman" panose="02020603050405020304" pitchFamily="18" charset="0"/>
+              </a:rPr>
+              <a:t>avoir un premier aperçu des performances de nos algorithmes dans un cas non trivial : Quand ça se croise</a:t>
+            </a:r>
+          </a:p>
+          <a:p>
+            <a:r>
+              <a:rPr lang="fr-FR" sz="1800" dirty="0">
+                <a:effectLst/>
+                <a:latin typeface="Calibri" panose="020F0502020204030204" pitchFamily="34" charset="0"/>
+                <a:cs typeface="Times New Roman" panose="02020603050405020304" pitchFamily="18" charset="0"/>
+              </a:rPr>
+              <a:t>Mais aussi quand ça se rapproche à la fin</a:t>
+            </a:r>
+          </a:p>
+          <a:p>
+            <a:endParaRPr lang="fr-FR" sz="1800" dirty="0">
+              <a:effectLst/>
+              <a:latin typeface="Calibri" panose="020F0502020204030204" pitchFamily="34" charset="0"/>
+              <a:cs typeface="Times New Roman" panose="02020603050405020304" pitchFamily="18" charset="0"/>
+            </a:endParaRPr>
+          </a:p>
+          <a:p>
+            <a:endParaRPr lang="fr-FR" dirty="0"/>
+          </a:p>
+        </p:txBody>
+      </p:sp>
+      <p:sp>
+        <p:nvSpPr>
+          <p:cNvPr id="4" name="Espace réservé du numéro de diapositive 3"/>
+          <p:cNvSpPr>
+            <a:spLocks noGrp="1"/>
+          </p:cNvSpPr>
+          <p:nvPr>
+            <p:ph type="sldNum" sz="quarter" idx="5"/>
+          </p:nvPr>
+        </p:nvSpPr>
+        <p:spPr/>
+        <p:txBody>
+          <a:bodyPr/>
+          <a:lstStyle/>
+          <a:p>
+            <a:fld id="{946D1AFA-ED8B-B94E-B29F-CABEC407D280}" type="slidenum">
+              <a:rPr lang="fr-FR" smtClean="0"/>
+              <a:t>13</a:t>
+            </a:fld>
+            <a:endParaRPr lang="fr-FR"/>
+          </a:p>
+        </p:txBody>
+      </p:sp>
+    </p:spTree>
+    <p:extLst>
+      <p:ext uri="{BB962C8B-B14F-4D97-AF65-F5344CB8AC3E}">
+        <p14:creationId xmlns:p14="http://schemas.microsoft.com/office/powerpoint/2010/main" val="4288920230"/>
+      </p:ext>
+    </p:extLst>
+  </p:cSld>
+  <p:clrMapOvr>
+    <a:masterClrMapping/>
+  </p:clrMapOvr>
+</p:notes>
+</file>
+
+<file path=ppt/notesSlides/notesSlide14.xml><?xml version="1.0" encoding="utf-8"?>
+<p:notes xmlns:a="http://schemas.openxmlformats.org/drawingml/2006/main" xmlns:r="http://schemas.openxmlformats.org/officeDocument/2006/relationships" xmlns:p="http://schemas.openxmlformats.org/presentationml/2006/main">
+  <p:cSld>
+    <p:spTree>
+      <p:nvGrpSpPr>
+        <p:cNvPr id="1" name=""/>
+        <p:cNvGrpSpPr/>
+        <p:nvPr/>
+      </p:nvGrpSpPr>
+      <p:grpSpPr>
+        <a:xfrm>
+          <a:off x="0" y="0"/>
+          <a:ext cx="0" cy="0"/>
+          <a:chOff x="0" y="0"/>
+          <a:chExt cx="0" cy="0"/>
+        </a:xfrm>
+      </p:grpSpPr>
+      <p:sp>
+        <p:nvSpPr>
+          <p:cNvPr id="2" name="Espace réservé de l'image des diapositives 1"/>
+          <p:cNvSpPr>
+            <a:spLocks noGrp="1" noRot="1" noChangeAspect="1"/>
+          </p:cNvSpPr>
+          <p:nvPr>
+            <p:ph type="sldImg"/>
+          </p:nvPr>
+        </p:nvSpPr>
+        <p:spPr/>
+      </p:sp>
+      <p:sp>
+        <p:nvSpPr>
+          <p:cNvPr id="3" name="Espace réservé des notes 2"/>
+          <p:cNvSpPr>
+            <a:spLocks noGrp="1"/>
+          </p:cNvSpPr>
+          <p:nvPr>
+            <p:ph type="body" idx="1"/>
+          </p:nvPr>
+        </p:nvSpPr>
+        <p:spPr/>
+        <p:txBody>
+          <a:bodyPr/>
+          <a:lstStyle/>
+          <a:p>
+            <a:pPr marL="0" marR="0" lvl="0" indent="0" algn="l" defTabSz="914400" rtl="0" eaLnBrk="1" fontAlgn="auto" latinLnBrk="0" hangingPunct="1">
+              <a:lnSpc>
+                <a:spcPct val="100000"/>
+              </a:lnSpc>
+              <a:spcBef>
+                <a:spcPts val="0"/>
+              </a:spcBef>
+              <a:spcAft>
+                <a:spcPts val="0"/>
+              </a:spcAft>
+              <a:buClrTx/>
+              <a:buSzTx/>
+              <a:buFontTx/>
+              <a:buNone/>
+              <a:tabLst/>
+              <a:defRPr/>
+            </a:pPr>
+            <a:r>
+              <a:rPr lang="fr-FR" sz="1800" dirty="0">
+                <a:effectLst/>
+                <a:latin typeface="Calibri" panose="020F0502020204030204" pitchFamily="34" charset="0"/>
+                <a:ea typeface="Calibri" panose="020F0502020204030204" pitchFamily="34" charset="0"/>
+                <a:cs typeface="Times New Roman" panose="02020603050405020304" pitchFamily="18" charset="0"/>
+              </a:rPr>
+              <a:t>Il s’avère que les lobes sont bien de la même taille lorsque les sources sont finalement séparées angulairement, mais la méthode CBF va d’abord détecter un changement de pic brusque dans la direction de la cible la plus proche avant que les lobes ne soient totalement séparés.</a:t>
+            </a:r>
+          </a:p>
+          <a:p>
+            <a:endParaRPr lang="fr-FR" dirty="0"/>
+          </a:p>
+        </p:txBody>
+      </p:sp>
+      <p:sp>
+        <p:nvSpPr>
+          <p:cNvPr id="4" name="Espace réservé du numéro de diapositive 3"/>
+          <p:cNvSpPr>
+            <a:spLocks noGrp="1"/>
+          </p:cNvSpPr>
+          <p:nvPr>
+            <p:ph type="sldNum" sz="quarter" idx="5"/>
+          </p:nvPr>
+        </p:nvSpPr>
+        <p:spPr/>
+        <p:txBody>
+          <a:bodyPr/>
+          <a:lstStyle/>
+          <a:p>
+            <a:fld id="{946D1AFA-ED8B-B94E-B29F-CABEC407D280}" type="slidenum">
+              <a:rPr lang="fr-FR" smtClean="0"/>
+              <a:t>14</a:t>
+            </a:fld>
+            <a:endParaRPr lang="fr-FR"/>
+          </a:p>
+        </p:txBody>
+      </p:sp>
+    </p:spTree>
+    <p:extLst>
+      <p:ext uri="{BB962C8B-B14F-4D97-AF65-F5344CB8AC3E}">
+        <p14:creationId xmlns:p14="http://schemas.microsoft.com/office/powerpoint/2010/main" val="1499995410"/>
       </p:ext>
     </p:extLst>
   </p:cSld>
@@ -2170,7 +2690,7 @@
             <a:fld id="{B61BEF0D-F0BB-DE4B-95CE-6DB70DBA9567}" type="datetimeFigureOut">
               <a:rPr lang="en-US" dirty="0"/>
               <a:pPr/>
-              <a:t>11/2/2020</a:t>
+              <a:t>11/3/2020</a:t>
             </a:fld>
             <a:endParaRPr lang="en-US" dirty="0"/>
           </a:p>
@@ -2491,7 +3011,7 @@
             <a:fld id="{B61BEF0D-F0BB-DE4B-95CE-6DB70DBA9567}" type="datetimeFigureOut">
               <a:rPr lang="en-US" dirty="0"/>
               <a:pPr/>
-              <a:t>11/2/2020</a:t>
+              <a:t>11/3/2020</a:t>
             </a:fld>
             <a:endParaRPr lang="en-US" dirty="0"/>
           </a:p>
@@ -2736,7 +3256,7 @@
             <a:fld id="{B61BEF0D-F0BB-DE4B-95CE-6DB70DBA9567}" type="datetimeFigureOut">
               <a:rPr lang="en-US" dirty="0"/>
               <a:pPr/>
-              <a:t>11/2/2020</a:t>
+              <a:t>11/3/2020</a:t>
             </a:fld>
             <a:endParaRPr lang="en-US" dirty="0"/>
           </a:p>
@@ -3072,7 +3592,7 @@
             <a:fld id="{B61BEF0D-F0BB-DE4B-95CE-6DB70DBA9567}" type="datetimeFigureOut">
               <a:rPr lang="en-US" dirty="0"/>
               <a:pPr/>
-              <a:t>11/2/2020</a:t>
+              <a:t>11/3/2020</a:t>
             </a:fld>
             <a:endParaRPr lang="en-US" dirty="0"/>
           </a:p>
@@ -3416,7 +3936,7 @@
             <a:fld id="{B61BEF0D-F0BB-DE4B-95CE-6DB70DBA9567}" type="datetimeFigureOut">
               <a:rPr lang="en-US" dirty="0"/>
               <a:pPr/>
-              <a:t>11/2/2020</a:t>
+              <a:t>11/3/2020</a:t>
             </a:fld>
             <a:endParaRPr lang="en-US" dirty="0"/>
           </a:p>
@@ -3787,7 +4307,7 @@
             <a:fld id="{B61BEF0D-F0BB-DE4B-95CE-6DB70DBA9567}" type="datetimeFigureOut">
               <a:rPr lang="en-US" dirty="0"/>
               <a:pPr/>
-              <a:t>11/2/2020</a:t>
+              <a:t>11/3/2020</a:t>
             </a:fld>
             <a:endParaRPr lang="en-US" dirty="0"/>
           </a:p>
@@ -4254,7 +4774,7 @@
             <a:fld id="{B61BEF0D-F0BB-DE4B-95CE-6DB70DBA9567}" type="datetimeFigureOut">
               <a:rPr lang="en-US" dirty="0"/>
               <a:pPr/>
-              <a:t>11/2/2020</a:t>
+              <a:t>11/3/2020</a:t>
             </a:fld>
             <a:endParaRPr lang="en-US" dirty="0"/>
           </a:p>
@@ -4456,7 +4976,7 @@
             <a:fld id="{B61BEF0D-F0BB-DE4B-95CE-6DB70DBA9567}" type="datetimeFigureOut">
               <a:rPr lang="en-US" dirty="0"/>
               <a:pPr/>
-              <a:t>11/2/2020</a:t>
+              <a:t>11/3/2020</a:t>
             </a:fld>
             <a:endParaRPr lang="en-US" dirty="0"/>
           </a:p>
@@ -4664,7 +5184,7 @@
             <a:fld id="{B61BEF0D-F0BB-DE4B-95CE-6DB70DBA9567}" type="datetimeFigureOut">
               <a:rPr lang="en-US" dirty="0"/>
               <a:pPr/>
-              <a:t>11/2/2020</a:t>
+              <a:t>11/3/2020</a:t>
             </a:fld>
             <a:endParaRPr lang="en-US" dirty="0"/>
           </a:p>
@@ -4892,7 +5412,7 @@
           <a:p>
             <a:fld id="{52647F38-B617-4D2F-AE0A-013F0C4D2C57}" type="datetimeFigureOut">
               <a:rPr lang="en-US" dirty="0"/>
-              <a:t>11/2/2020</a:t>
+              <a:t>11/3/2020</a:t>
             </a:fld>
             <a:endParaRPr lang="en-US" dirty="0"/>
           </a:p>
@@ -5136,7 +5656,7 @@
             <a:fld id="{B61BEF0D-F0BB-DE4B-95CE-6DB70DBA9567}" type="datetimeFigureOut">
               <a:rPr lang="en-US" dirty="0"/>
               <a:pPr/>
-              <a:t>11/2/2020</a:t>
+              <a:t>11/3/2020</a:t>
             </a:fld>
             <a:endParaRPr lang="en-US" dirty="0"/>
           </a:p>
@@ -5430,7 +5950,7 @@
           <a:p>
             <a:fld id="{05BFA754-D5C3-4E66-96A6-867B257F58DC}" type="datetimeFigureOut">
               <a:rPr lang="en-US" dirty="0"/>
-              <a:t>11/2/2020</a:t>
+              <a:t>11/3/2020</a:t>
             </a:fld>
             <a:endParaRPr lang="en-US" dirty="0"/>
           </a:p>
@@ -5820,7 +6340,7 @@
             <a:fld id="{B61BEF0D-F0BB-DE4B-95CE-6DB70DBA9567}" type="datetimeFigureOut">
               <a:rPr lang="en-US" dirty="0"/>
               <a:pPr/>
-              <a:t>11/2/2020</a:t>
+              <a:t>11/3/2020</a:t>
             </a:fld>
             <a:endParaRPr lang="en-US" dirty="0"/>
           </a:p>
@@ -5966,7 +6486,7 @@
             <a:fld id="{B61BEF0D-F0BB-DE4B-95CE-6DB70DBA9567}" type="datetimeFigureOut">
               <a:rPr lang="en-US" dirty="0"/>
               <a:pPr/>
-              <a:t>11/2/2020</a:t>
+              <a:t>11/3/2020</a:t>
             </a:fld>
             <a:endParaRPr lang="en-US" dirty="0"/>
           </a:p>
@@ -6089,7 +6609,7 @@
             <a:fld id="{B61BEF0D-F0BB-DE4B-95CE-6DB70DBA9567}" type="datetimeFigureOut">
               <a:rPr lang="en-US" dirty="0"/>
               <a:pPr/>
-              <a:t>11/2/2020</a:t>
+              <a:t>11/3/2020</a:t>
             </a:fld>
             <a:endParaRPr lang="en-US" dirty="0"/>
           </a:p>
@@ -6341,7 +6861,7 @@
             <a:fld id="{B61BEF0D-F0BB-DE4B-95CE-6DB70DBA9567}" type="datetimeFigureOut">
               <a:rPr lang="en-US" dirty="0"/>
               <a:pPr/>
-              <a:t>11/2/2020</a:t>
+              <a:t>11/3/2020</a:t>
             </a:fld>
             <a:endParaRPr lang="en-US" dirty="0"/>
           </a:p>
@@ -6653,7 +7173,7 @@
             <a:fld id="{B61BEF0D-F0BB-DE4B-95CE-6DB70DBA9567}" type="datetimeFigureOut">
               <a:rPr lang="en-US" dirty="0"/>
               <a:pPr/>
-              <a:t>11/2/2020</a:t>
+              <a:t>11/3/2020</a:t>
             </a:fld>
             <a:endParaRPr lang="en-US" dirty="0"/>
           </a:p>
@@ -7001,7 +7521,7 @@
             <a:fld id="{B61BEF0D-F0BB-DE4B-95CE-6DB70DBA9567}" type="datetimeFigureOut">
               <a:rPr lang="en-US" dirty="0"/>
               <a:pPr/>
-              <a:t>11/2/2020</a:t>
+              <a:t>11/3/2020</a:t>
             </a:fld>
             <a:endParaRPr lang="en-US" dirty="0"/>
           </a:p>
@@ -9474,6 +9994,14 @@
 <file path=ppt/slides/slide11.xml><?xml version="1.0" encoding="utf-8"?>
 <p:sld xmlns:a="http://schemas.openxmlformats.org/drawingml/2006/main" xmlns:r="http://schemas.openxmlformats.org/officeDocument/2006/relationships" xmlns:p="http://schemas.openxmlformats.org/presentationml/2006/main">
   <p:cSld>
+    <p:bg>
+      <p:bgPr>
+        <a:solidFill>
+          <a:schemeClr val="bg1"/>
+        </a:solidFill>
+        <a:effectLst/>
+      </p:bgPr>
+    </p:bg>
     <p:spTree>
       <p:nvGrpSpPr>
         <p:cNvPr id="1" name=""/>
@@ -9488,6 +10016,461 @@
           <a:chExt cx="0" cy="0"/>
         </a:xfrm>
       </p:grpSpPr>
+      <p:grpSp>
+        <p:nvGrpSpPr>
+          <p:cNvPr id="10" name="Group 9">
+            <a:extLst>
+              <a:ext uri="{FF2B5EF4-FFF2-40B4-BE49-F238E27FC236}">
+                <a16:creationId xmlns:a16="http://schemas.microsoft.com/office/drawing/2014/main" id="{3F6D81C7-B083-478E-82FE-089A8CB72EB8}"/>
+              </a:ext>
+              <a:ext uri="{C183D7F6-B498-43B3-948B-1728B52AA6E4}">
+                <adec:decorative xmlns:adec="http://schemas.microsoft.com/office/drawing/2017/decorative" val="1"/>
+              </a:ext>
+            </a:extLst>
+          </p:cNvPr>
+          <p:cNvGrpSpPr>
+            <a:grpSpLocks noGrp="1" noUngrp="1" noRot="1" noChangeAspect="1" noMove="1" noResize="1"/>
+          </p:cNvGrpSpPr>
+          <p:nvPr>
+            <p:extLst>
+              <p:ext uri="{386F3935-93C4-4BCD-93E2-E3B085C9AB24}">
+                <p16:designElem xmlns:p16="http://schemas.microsoft.com/office/powerpoint/2015/main" val="1"/>
+              </p:ext>
+            </p:extLst>
+          </p:nvPr>
+        </p:nvGrpSpPr>
+        <p:grpSpPr>
+          <a:xfrm>
+            <a:off x="-15736" y="0"/>
+            <a:ext cx="12229962" cy="6856214"/>
+            <a:chOff x="-15736" y="0"/>
+            <a:chExt cx="12229962" cy="6856214"/>
+          </a:xfrm>
+        </p:grpSpPr>
+        <p:pic>
+          <p:nvPicPr>
+            <p:cNvPr id="11" name="Picture 10">
+              <a:extLst>
+                <a:ext uri="{FF2B5EF4-FFF2-40B4-BE49-F238E27FC236}">
+                  <a16:creationId xmlns:a16="http://schemas.microsoft.com/office/drawing/2014/main" id="{8398EDA2-4889-433D-AC01-5214D79764ED}"/>
+                </a:ext>
+                <a:ext uri="{C183D7F6-B498-43B3-948B-1728B52AA6E4}">
+                  <adec:decorative xmlns:adec="http://schemas.microsoft.com/office/drawing/2017/decorative" val="1"/>
+                </a:ext>
+              </a:extLst>
+            </p:cNvPr>
+            <p:cNvPicPr>
+              <a:picLocks noChangeAspect="1"/>
+            </p:cNvPicPr>
+            <p:nvPr>
+              <p:extLst>
+                <p:ext uri="{386F3935-93C4-4BCD-93E2-E3B085C9AB24}">
+                  <p16:designElem xmlns:p16="http://schemas.microsoft.com/office/powerpoint/2015/main" val="1"/>
+                </p:ext>
+              </p:extLst>
+            </p:nvPr>
+          </p:nvPicPr>
+          <p:blipFill>
+            <a:blip r:embed="rId3">
+              <a:extLst>
+                <a:ext uri="{28A0092B-C50C-407E-A947-70E740481C1C}">
+                  <a14:useLocalDpi xmlns:a14="http://schemas.microsoft.com/office/drawing/2010/main" val="0"/>
+                </a:ext>
+              </a:extLst>
+            </a:blip>
+            <a:stretch>
+              <a:fillRect/>
+            </a:stretch>
+          </p:blipFill>
+          <p:spPr>
+            <a:xfrm>
+              <a:off x="0" y="0"/>
+              <a:ext cx="12188825" cy="6856214"/>
+            </a:xfrm>
+            <a:prstGeom prst="rect">
+              <a:avLst/>
+            </a:prstGeom>
+          </p:spPr>
+        </p:pic>
+        <p:sp>
+          <p:nvSpPr>
+            <p:cNvPr id="12" name="Rectangle 11">
+              <a:extLst>
+                <a:ext uri="{FF2B5EF4-FFF2-40B4-BE49-F238E27FC236}">
+                  <a16:creationId xmlns:a16="http://schemas.microsoft.com/office/drawing/2014/main" id="{0099D46A-AF52-46FD-938B-D31189460A2F}"/>
+                </a:ext>
+                <a:ext uri="{C183D7F6-B498-43B3-948B-1728B52AA6E4}">
+                  <adec:decorative xmlns:adec="http://schemas.microsoft.com/office/drawing/2017/decorative" val="1"/>
+                </a:ext>
+              </a:extLst>
+            </p:cNvPr>
+            <p:cNvSpPr/>
+            <p:nvPr>
+              <p:extLst>
+                <p:ext uri="{386F3935-93C4-4BCD-93E2-E3B085C9AB24}">
+                  <p16:designElem xmlns:p16="http://schemas.microsoft.com/office/powerpoint/2015/main" val="1"/>
+                </p:ext>
+              </p:extLst>
+            </p:nvPr>
+          </p:nvSpPr>
+          <p:spPr>
+            <a:xfrm>
+              <a:off x="608012" y="609600"/>
+              <a:ext cx="10972800" cy="5638800"/>
+            </a:xfrm>
+            <a:prstGeom prst="rect">
+              <a:avLst/>
+            </a:prstGeom>
+            <a:noFill/>
+            <a:ln w="15875" cap="flat">
+              <a:miter lim="800000"/>
+            </a:ln>
+          </p:spPr>
+          <p:style>
+            <a:lnRef idx="1">
+              <a:schemeClr val="accent1"/>
+            </a:lnRef>
+            <a:fillRef idx="3">
+              <a:schemeClr val="accent1"/>
+            </a:fillRef>
+            <a:effectRef idx="2">
+              <a:schemeClr val="accent1"/>
+            </a:effectRef>
+            <a:fontRef idx="minor">
+              <a:schemeClr val="lt1"/>
+            </a:fontRef>
+          </p:style>
+        </p:sp>
+        <p:pic>
+          <p:nvPicPr>
+            <p:cNvPr id="13" name="Picture 12">
+              <a:extLst>
+                <a:ext uri="{FF2B5EF4-FFF2-40B4-BE49-F238E27FC236}">
+                  <a16:creationId xmlns:a16="http://schemas.microsoft.com/office/drawing/2014/main" id="{C933E919-C473-4F0E-9DBC-CC65FC9E926E}"/>
+                </a:ext>
+                <a:ext uri="{C183D7F6-B498-43B3-948B-1728B52AA6E4}">
+                  <adec:decorative xmlns:adec="http://schemas.microsoft.com/office/drawing/2017/decorative" val="1"/>
+                </a:ext>
+              </a:extLst>
+            </p:cNvPr>
+            <p:cNvPicPr>
+              <a:picLocks noChangeAspect="1"/>
+            </p:cNvPicPr>
+            <p:nvPr>
+              <p:extLst>
+                <p:ext uri="{386F3935-93C4-4BCD-93E2-E3B085C9AB24}">
+                  <p16:designElem xmlns:p16="http://schemas.microsoft.com/office/powerpoint/2015/main" val="1"/>
+                </p:ext>
+              </p:extLst>
+            </p:nvPr>
+          </p:nvPicPr>
+          <p:blipFill rotWithShape="1">
+            <a:blip r:embed="rId4">
+              <a:extLst>
+                <a:ext uri="{28A0092B-C50C-407E-A947-70E740481C1C}">
+                  <a14:useLocalDpi xmlns:a14="http://schemas.microsoft.com/office/drawing/2010/main" val="0"/>
+                </a:ext>
+              </a:extLst>
+            </a:blip>
+            <a:srcRect/>
+            <a:stretch/>
+          </p:blipFill>
+          <p:spPr>
+            <a:xfrm>
+              <a:off x="-15736" y="3153832"/>
+              <a:ext cx="777240" cy="606425"/>
+            </a:xfrm>
+            <a:prstGeom prst="rect">
+              <a:avLst/>
+            </a:prstGeom>
+          </p:spPr>
+        </p:pic>
+        <p:pic>
+          <p:nvPicPr>
+            <p:cNvPr id="14" name="Picture 13">
+              <a:extLst>
+                <a:ext uri="{FF2B5EF4-FFF2-40B4-BE49-F238E27FC236}">
+                  <a16:creationId xmlns:a16="http://schemas.microsoft.com/office/drawing/2014/main" id="{FBBF3BDD-5C99-4FDC-BBCB-E711359D93F6}"/>
+                </a:ext>
+                <a:ext uri="{C183D7F6-B498-43B3-948B-1728B52AA6E4}">
+                  <adec:decorative xmlns:adec="http://schemas.microsoft.com/office/drawing/2017/decorative" val="1"/>
+                </a:ext>
+              </a:extLst>
+            </p:cNvPr>
+            <p:cNvPicPr>
+              <a:picLocks noChangeAspect="1"/>
+            </p:cNvPicPr>
+            <p:nvPr>
+              <p:extLst>
+                <p:ext uri="{386F3935-93C4-4BCD-93E2-E3B085C9AB24}">
+                  <p16:designElem xmlns:p16="http://schemas.microsoft.com/office/powerpoint/2015/main" val="1"/>
+                </p:ext>
+              </p:extLst>
+            </p:nvPr>
+          </p:nvPicPr>
+          <p:blipFill rotWithShape="1">
+            <a:blip r:embed="rId4">
+              <a:extLst>
+                <a:ext uri="{28A0092B-C50C-407E-A947-70E740481C1C}">
+                  <a14:useLocalDpi xmlns:a14="http://schemas.microsoft.com/office/drawing/2010/main" val="0"/>
+                </a:ext>
+              </a:extLst>
+            </a:blip>
+            <a:srcRect/>
+            <a:stretch/>
+          </p:blipFill>
+          <p:spPr>
+            <a:xfrm>
+              <a:off x="11436986" y="3153832"/>
+              <a:ext cx="777240" cy="606425"/>
+            </a:xfrm>
+            <a:prstGeom prst="rect">
+              <a:avLst/>
+            </a:prstGeom>
+          </p:spPr>
+        </p:pic>
+      </p:grpSp>
+      <p:cxnSp>
+        <p:nvCxnSpPr>
+          <p:cNvPr id="16" name="Straight Connector 15">
+            <a:extLst>
+              <a:ext uri="{FF2B5EF4-FFF2-40B4-BE49-F238E27FC236}">
+                <a16:creationId xmlns:a16="http://schemas.microsoft.com/office/drawing/2014/main" id="{F06B54F2-CD11-4359-A7D6-DA7C76C091A6}"/>
+              </a:ext>
+              <a:ext uri="{C183D7F6-B498-43B3-948B-1728B52AA6E4}">
+                <adec:decorative xmlns:adec="http://schemas.microsoft.com/office/drawing/2017/decorative" val="1"/>
+              </a:ext>
+            </a:extLst>
+          </p:cNvPr>
+          <p:cNvCxnSpPr>
+            <a:cxnSpLocks noGrp="1" noRot="1" noChangeAspect="1" noMove="1" noResize="1" noEditPoints="1" noAdjustHandles="1" noChangeArrowheads="1" noChangeShapeType="1"/>
+          </p:cNvCxnSpPr>
+          <p:nvPr>
+            <p:extLst>
+              <p:ext uri="{386F3935-93C4-4BCD-93E2-E3B085C9AB24}">
+                <p16:designElem xmlns:p16="http://schemas.microsoft.com/office/powerpoint/2015/main" val="1"/>
+              </p:ext>
+            </p:extLst>
+          </p:nvPr>
+        </p:nvCxnSpPr>
+        <p:spPr>
+          <a:xfrm>
+            <a:off x="1396169" y="2421466"/>
+            <a:ext cx="9407298" cy="0"/>
+          </a:xfrm>
+          <a:prstGeom prst="line">
+            <a:avLst/>
+          </a:prstGeom>
+          <a:ln w="15875"/>
+        </p:spPr>
+        <p:style>
+          <a:lnRef idx="2">
+            <a:schemeClr val="accent1"/>
+          </a:lnRef>
+          <a:fillRef idx="0">
+            <a:schemeClr val="accent1"/>
+          </a:fillRef>
+          <a:effectRef idx="1">
+            <a:schemeClr val="accent1"/>
+          </a:effectRef>
+          <a:fontRef idx="minor">
+            <a:schemeClr val="tx1"/>
+          </a:fontRef>
+        </p:style>
+      </p:cxnSp>
+      <p:sp>
+        <p:nvSpPr>
+          <p:cNvPr id="18" name="Rectangle 17">
+            <a:extLst>
+              <a:ext uri="{FF2B5EF4-FFF2-40B4-BE49-F238E27FC236}">
+                <a16:creationId xmlns:a16="http://schemas.microsoft.com/office/drawing/2014/main" id="{333F0879-3DA0-4CB8-B35E-A0AD42558191}"/>
+              </a:ext>
+              <a:ext uri="{C183D7F6-B498-43B3-948B-1728B52AA6E4}">
+                <adec:decorative xmlns:adec="http://schemas.microsoft.com/office/drawing/2017/decorative" val="1"/>
+              </a:ext>
+            </a:extLst>
+          </p:cNvPr>
+          <p:cNvSpPr>
+            <a:spLocks noGrp="1" noRot="1" noChangeAspect="1" noMove="1" noResize="1" noEditPoints="1" noAdjustHandles="1" noChangeArrowheads="1" noChangeShapeType="1" noTextEdit="1"/>
+          </p:cNvSpPr>
+          <p:nvPr>
+            <p:extLst>
+              <p:ext uri="{386F3935-93C4-4BCD-93E2-E3B085C9AB24}">
+                <p16:designElem xmlns:p16="http://schemas.microsoft.com/office/powerpoint/2015/main" val="1"/>
+              </p:ext>
+            </p:extLst>
+          </p:nvPr>
+        </p:nvSpPr>
+        <p:spPr>
+          <a:xfrm>
+            <a:off x="0" y="2"/>
+            <a:ext cx="12188952" cy="6858000"/>
+          </a:xfrm>
+          <a:prstGeom prst="rect">
+            <a:avLst/>
+          </a:prstGeom>
+          <a:ln>
+            <a:noFill/>
+          </a:ln>
+        </p:spPr>
+        <p:style>
+          <a:lnRef idx="2">
+            <a:schemeClr val="accent1">
+              <a:shade val="50000"/>
+            </a:schemeClr>
+          </a:lnRef>
+          <a:fillRef idx="1003">
+            <a:schemeClr val="lt1"/>
+          </a:fillRef>
+          <a:effectRef idx="0">
+            <a:schemeClr val="accent1"/>
+          </a:effectRef>
+          <a:fontRef idx="minor">
+            <a:schemeClr val="lt1"/>
+          </a:fontRef>
+        </p:style>
+        <p:txBody>
+          <a:bodyPr rtlCol="0" anchor="ctr"/>
+          <a:lstStyle/>
+          <a:p>
+            <a:pPr algn="ctr"/>
+            <a:endParaRPr lang="en-US"/>
+          </a:p>
+        </p:txBody>
+      </p:sp>
+      <p:sp>
+        <p:nvSpPr>
+          <p:cNvPr id="20" name="Rectangle 19">
+            <a:extLst>
+              <a:ext uri="{FF2B5EF4-FFF2-40B4-BE49-F238E27FC236}">
+                <a16:creationId xmlns:a16="http://schemas.microsoft.com/office/drawing/2014/main" id="{324D2183-F388-476E-92A9-D6639D698580}"/>
+              </a:ext>
+              <a:ext uri="{C183D7F6-B498-43B3-948B-1728B52AA6E4}">
+                <adec:decorative xmlns:adec="http://schemas.microsoft.com/office/drawing/2017/decorative" val="1"/>
+              </a:ext>
+            </a:extLst>
+          </p:cNvPr>
+          <p:cNvSpPr>
+            <a:spLocks noGrp="1" noRot="1" noChangeAspect="1" noMove="1" noResize="1" noEditPoints="1" noAdjustHandles="1" noChangeArrowheads="1" noChangeShapeType="1" noTextEdit="1"/>
+          </p:cNvSpPr>
+          <p:nvPr>
+            <p:extLst>
+              <p:ext uri="{386F3935-93C4-4BCD-93E2-E3B085C9AB24}">
+                <p16:designElem xmlns:p16="http://schemas.microsoft.com/office/powerpoint/2015/main" val="1"/>
+              </p:ext>
+            </p:extLst>
+          </p:nvPr>
+        </p:nvSpPr>
+        <p:spPr>
+          <a:xfrm>
+            <a:off x="486138" y="496090"/>
+            <a:ext cx="3823215" cy="5883295"/>
+          </a:xfrm>
+          <a:prstGeom prst="rect">
+            <a:avLst/>
+          </a:prstGeom>
+          <a:blipFill dpi="0" rotWithShape="1">
+            <a:blip r:embed="rId5"/>
+            <a:srcRect/>
+            <a:tile tx="0" ty="0" sx="100000" sy="100000" flip="none" algn="tl"/>
+          </a:blipFill>
+          <a:ln>
+            <a:noFill/>
+          </a:ln>
+          <a:effectLst>
+            <a:outerShdw blurRad="114300" dist="127000" dir="5400000" sx="99000" sy="99000" algn="t" rotWithShape="0">
+              <a:prstClr val="black">
+                <a:alpha val="40000"/>
+              </a:prstClr>
+            </a:outerShdw>
+          </a:effectLst>
+          <a:scene3d>
+            <a:camera prst="orthographicFront"/>
+            <a:lightRig rig="twoPt" dir="t"/>
+          </a:scene3d>
+          <a:sp3d contourW="6350">
+            <a:bevelT w="12700" h="0" prst="coolSlant"/>
+            <a:contourClr>
+              <a:schemeClr val="bg2"/>
+            </a:contourClr>
+          </a:sp3d>
+        </p:spPr>
+        <p:style>
+          <a:lnRef idx="2">
+            <a:schemeClr val="accent1">
+              <a:shade val="50000"/>
+            </a:schemeClr>
+          </a:lnRef>
+          <a:fillRef idx="1">
+            <a:schemeClr val="accent1"/>
+          </a:fillRef>
+          <a:effectRef idx="0">
+            <a:schemeClr val="accent1"/>
+          </a:effectRef>
+          <a:fontRef idx="minor">
+            <a:schemeClr val="lt1"/>
+          </a:fontRef>
+        </p:style>
+        <p:txBody>
+          <a:bodyPr rtlCol="0" anchor="ctr"/>
+          <a:lstStyle/>
+          <a:p>
+            <a:pPr algn="ctr"/>
+            <a:endParaRPr lang="en-US"/>
+          </a:p>
+        </p:txBody>
+      </p:sp>
+      <p:sp>
+        <p:nvSpPr>
+          <p:cNvPr id="22" name="Rectangle 21">
+            <a:extLst>
+              <a:ext uri="{FF2B5EF4-FFF2-40B4-BE49-F238E27FC236}">
+                <a16:creationId xmlns:a16="http://schemas.microsoft.com/office/drawing/2014/main" id="{243462E7-1698-4B21-BE89-AEFAC7C2FEFA}"/>
+              </a:ext>
+              <a:ext uri="{C183D7F6-B498-43B3-948B-1728B52AA6E4}">
+                <adec:decorative xmlns:adec="http://schemas.microsoft.com/office/drawing/2017/decorative" val="1"/>
+              </a:ext>
+            </a:extLst>
+          </p:cNvPr>
+          <p:cNvSpPr>
+            <a:spLocks noGrp="1" noRot="1" noChangeAspect="1" noMove="1" noResize="1" noEditPoints="1" noAdjustHandles="1" noChangeArrowheads="1" noChangeShapeType="1" noTextEdit="1"/>
+          </p:cNvSpPr>
+          <p:nvPr>
+            <p:extLst>
+              <p:ext uri="{386F3935-93C4-4BCD-93E2-E3B085C9AB24}">
+                <p16:designElem xmlns:p16="http://schemas.microsoft.com/office/powerpoint/2015/main" val="1"/>
+              </p:ext>
+            </p:extLst>
+          </p:nvPr>
+        </p:nvSpPr>
+        <p:spPr>
+          <a:xfrm>
+            <a:off x="608012" y="609602"/>
+            <a:ext cx="3552006" cy="5638800"/>
+          </a:xfrm>
+          <a:prstGeom prst="rect">
+            <a:avLst/>
+          </a:prstGeom>
+          <a:noFill/>
+          <a:ln w="15875" cap="flat">
+            <a:miter lim="800000"/>
+          </a:ln>
+        </p:spPr>
+        <p:style>
+          <a:lnRef idx="1">
+            <a:schemeClr val="accent1"/>
+          </a:lnRef>
+          <a:fillRef idx="3">
+            <a:schemeClr val="accent1"/>
+          </a:fillRef>
+          <a:effectRef idx="2">
+            <a:schemeClr val="accent1"/>
+          </a:effectRef>
+          <a:fontRef idx="minor">
+            <a:schemeClr val="lt1"/>
+          </a:fontRef>
+        </p:style>
+      </p:sp>
       <p:sp>
         <p:nvSpPr>
           <p:cNvPr id="2" name="Titre 1">
@@ -9504,59 +10487,66 @@
             <p:ph type="title"/>
           </p:nvPr>
         </p:nvSpPr>
-        <p:spPr/>
-        <p:txBody>
-          <a:bodyPr/>
+        <p:spPr>
+          <a:xfrm>
+            <a:off x="929140" y="972766"/>
+            <a:ext cx="2835464" cy="1254868"/>
+          </a:xfrm>
+        </p:spPr>
+        <p:txBody>
+          <a:bodyPr vert="horz" lIns="91440" tIns="45720" rIns="91440" bIns="45720" rtlCol="0" anchor="b">
+            <a:normAutofit/>
+          </a:bodyPr>
           <a:lstStyle/>
           <a:p>
-            <a:r>
-              <a:rPr lang="fr-FR" dirty="0"/>
+            <a:pPr>
+              <a:lnSpc>
+                <a:spcPct val="90000"/>
+              </a:lnSpc>
+            </a:pPr>
+            <a:r>
+              <a:rPr lang="en-US">
+                <a:solidFill>
+                  <a:srgbClr val="262626"/>
+                </a:solidFill>
+              </a:rPr>
               <a:t>Algorithmes de </a:t>
             </a:r>
             <a:r>
-              <a:rPr lang="fr-FR" i="1" dirty="0"/>
+              <a:rPr lang="en-US" i="1">
+                <a:solidFill>
+                  <a:srgbClr val="262626"/>
+                </a:solidFill>
+              </a:rPr>
               <a:t>DoA</a:t>
             </a:r>
             <a:br>
-              <a:rPr lang="fr-FR" i="1" dirty="0"/>
+              <a:rPr lang="en-US" i="1">
+                <a:solidFill>
+                  <a:srgbClr val="262626"/>
+                </a:solidFill>
+              </a:rPr>
             </a:br>
             <a:br>
-              <a:rPr lang="fr-FR" i="1" dirty="0"/>
+              <a:rPr lang="en-US" i="1">
+                <a:solidFill>
+                  <a:srgbClr val="262626"/>
+                </a:solidFill>
+              </a:rPr>
             </a:br>
             <a:r>
-              <a:rPr lang="fr-FR" i="1" dirty="0"/>
-              <a:t>Directions of </a:t>
-            </a:r>
-            <a:r>
-              <a:rPr lang="fr-FR" i="1" dirty="0" err="1"/>
-              <a:t>Arrival</a:t>
-            </a:r>
-            <a:endParaRPr lang="fr-FR" dirty="0"/>
-          </a:p>
-        </p:txBody>
-      </p:sp>
-      <p:sp>
-        <p:nvSpPr>
-          <p:cNvPr id="3" name="Espace réservé du contenu 2">
-            <a:extLst>
-              <a:ext uri="{FF2B5EF4-FFF2-40B4-BE49-F238E27FC236}">
-                <a16:creationId xmlns:a16="http://schemas.microsoft.com/office/drawing/2014/main" id="{6B7A7356-5621-3941-969F-D7B161343073}"/>
-              </a:ext>
-            </a:extLst>
-          </p:cNvPr>
-          <p:cNvSpPr>
-            <a:spLocks noGrp="1"/>
-          </p:cNvSpPr>
-          <p:nvPr>
-            <p:ph idx="1"/>
-          </p:nvPr>
-        </p:nvSpPr>
-        <p:spPr/>
-        <p:txBody>
-          <a:bodyPr/>
-          <a:lstStyle/>
-          <a:p>
-            <a:endParaRPr lang="fr-FR" dirty="0"/>
+              <a:rPr lang="en-US" i="1">
+                <a:solidFill>
+                  <a:srgbClr val="262626"/>
+                </a:solidFill>
+              </a:rPr>
+              <a:t>Directions of Arrival</a:t>
+            </a:r>
+            <a:endParaRPr lang="en-US">
+              <a:solidFill>
+                <a:srgbClr val="262626"/>
+              </a:solidFill>
+            </a:endParaRPr>
           </a:p>
         </p:txBody>
       </p:sp>
@@ -9576,48 +10566,205 @@
             <p:ph type="body" sz="half" idx="2"/>
           </p:nvPr>
         </p:nvSpPr>
-        <p:spPr/>
-        <p:txBody>
-          <a:bodyPr/>
+        <p:spPr>
+          <a:xfrm>
+            <a:off x="929141" y="2430471"/>
+            <a:ext cx="2835464" cy="3552039"/>
+          </a:xfrm>
+        </p:spPr>
+        <p:txBody>
+          <a:bodyPr vert="horz" lIns="91440" tIns="45720" rIns="91440" bIns="45720" rtlCol="0" anchor="t">
+            <a:normAutofit/>
+          </a:bodyPr>
           <a:lstStyle/>
           <a:p>
-            <a:r>
-              <a:rPr lang="fr-FR" dirty="0"/>
+            <a:pPr algn="l">
+              <a:buFont typeface="Arial"/>
+              <a:buChar char="•"/>
+            </a:pPr>
+            <a:r>
+              <a:rPr lang="en-US" sz="1800" dirty="0">
+                <a:solidFill>
+                  <a:srgbClr val="262626"/>
+                </a:solidFill>
+              </a:rPr>
               <a:t>3 versions : </a:t>
             </a:r>
           </a:p>
           <a:p>
-            <a:pPr marL="285750" indent="-285750">
-              <a:buFontTx/>
-              <a:buChar char="-"/>
+            <a:pPr marL="285750" indent="-285750" algn="l">
+              <a:buFont typeface="Arial"/>
+              <a:buChar char="•"/>
             </a:pPr>
             <a:r>
-              <a:rPr lang="fr-FR" dirty="0"/>
+              <a:rPr lang="en-US" sz="1800" dirty="0">
+                <a:solidFill>
+                  <a:srgbClr val="262626"/>
+                </a:solidFill>
+              </a:rPr>
               <a:t>Classique</a:t>
             </a:r>
           </a:p>
           <a:p>
-            <a:pPr marL="285750" indent="-285750">
-              <a:buFontTx/>
-              <a:buChar char="-"/>
+            <a:pPr marL="285750" indent="-285750" algn="l">
+              <a:buFont typeface="Arial"/>
+              <a:buChar char="•"/>
             </a:pPr>
             <a:r>
-              <a:rPr lang="fr-FR" dirty="0"/>
+              <a:rPr lang="en-US" sz="1800" dirty="0">
+                <a:solidFill>
+                  <a:srgbClr val="262626"/>
+                </a:solidFill>
+              </a:rPr>
               <a:t>MUSIC</a:t>
             </a:r>
           </a:p>
           <a:p>
-            <a:pPr marL="285750" indent="-285750">
-              <a:buFontTx/>
-              <a:buChar char="-"/>
+            <a:pPr marL="285750" indent="-285750" algn="l">
+              <a:buFont typeface="Arial"/>
+              <a:buChar char="•"/>
             </a:pPr>
             <a:r>
-              <a:rPr lang="fr-FR" dirty="0"/>
-              <a:t>MVDR (aussi appelée CAPON)</a:t>
-            </a:r>
-          </a:p>
-        </p:txBody>
-      </p:sp>
+              <a:rPr lang="en-US" sz="1800" dirty="0">
+                <a:solidFill>
+                  <a:srgbClr val="262626"/>
+                </a:solidFill>
+              </a:rPr>
+              <a:t>MVDR (</a:t>
+            </a:r>
+            <a:r>
+              <a:rPr lang="en-US" sz="1800" dirty="0" err="1">
+                <a:solidFill>
+                  <a:srgbClr val="262626"/>
+                </a:solidFill>
+              </a:rPr>
+              <a:t>aussi</a:t>
+            </a:r>
+            <a:r>
+              <a:rPr lang="en-US" sz="1800" dirty="0">
+                <a:solidFill>
+                  <a:srgbClr val="262626"/>
+                </a:solidFill>
+              </a:rPr>
+              <a:t> </a:t>
+            </a:r>
+            <a:r>
+              <a:rPr lang="en-US" sz="1800" dirty="0" err="1">
+                <a:solidFill>
+                  <a:srgbClr val="262626"/>
+                </a:solidFill>
+              </a:rPr>
+              <a:t>appelée</a:t>
+            </a:r>
+            <a:r>
+              <a:rPr lang="en-US" sz="1800" dirty="0">
+                <a:solidFill>
+                  <a:srgbClr val="262626"/>
+                </a:solidFill>
+              </a:rPr>
+              <a:t> CAPON)</a:t>
+            </a:r>
+          </a:p>
+        </p:txBody>
+      </p:sp>
+      <p:sp useBgFill="1">
+        <p:nvSpPr>
+          <p:cNvPr id="24" name="Rectangle 23">
+            <a:extLst>
+              <a:ext uri="{FF2B5EF4-FFF2-40B4-BE49-F238E27FC236}">
+                <a16:creationId xmlns:a16="http://schemas.microsoft.com/office/drawing/2014/main" id="{6C22FCAC-D7EC-4A52-B153-FF761E2235B3}"/>
+              </a:ext>
+              <a:ext uri="{C183D7F6-B498-43B3-948B-1728B52AA6E4}">
+                <adec:decorative xmlns:adec="http://schemas.microsoft.com/office/drawing/2017/decorative" val="1"/>
+              </a:ext>
+            </a:extLst>
+          </p:cNvPr>
+          <p:cNvSpPr>
+            <a:spLocks noGrp="1" noRot="1" noChangeAspect="1" noMove="1" noResize="1" noEditPoints="1" noAdjustHandles="1" noChangeArrowheads="1" noChangeShapeType="1" noTextEdit="1"/>
+          </p:cNvSpPr>
+          <p:nvPr>
+            <p:extLst>
+              <p:ext uri="{386F3935-93C4-4BCD-93E2-E3B085C9AB24}">
+                <p16:designElem xmlns:p16="http://schemas.microsoft.com/office/powerpoint/2015/main" val="1"/>
+              </p:ext>
+            </p:extLst>
+          </p:nvPr>
+        </p:nvSpPr>
+        <p:spPr>
+          <a:xfrm>
+            <a:off x="4795491" y="0"/>
+            <a:ext cx="7396509" cy="6858002"/>
+          </a:xfrm>
+          <a:prstGeom prst="rect">
+            <a:avLst/>
+          </a:prstGeom>
+          <a:ln>
+            <a:noFill/>
+          </a:ln>
+        </p:spPr>
+        <p:style>
+          <a:lnRef idx="2">
+            <a:schemeClr val="accent1">
+              <a:shade val="50000"/>
+            </a:schemeClr>
+          </a:lnRef>
+          <a:fillRef idx="1">
+            <a:schemeClr val="accent1"/>
+          </a:fillRef>
+          <a:effectRef idx="0">
+            <a:schemeClr val="accent1"/>
+          </a:effectRef>
+          <a:fontRef idx="minor">
+            <a:schemeClr val="lt1"/>
+          </a:fontRef>
+        </p:style>
+        <p:txBody>
+          <a:bodyPr rtlCol="0" anchor="ctr"/>
+          <a:lstStyle/>
+          <a:p>
+            <a:pPr algn="ctr"/>
+            <a:endParaRPr lang="en-US"/>
+          </a:p>
+        </p:txBody>
+      </p:sp>
+      <p:pic>
+        <p:nvPicPr>
+          <p:cNvPr id="5" name="Espace réservé du contenu 4" descr="Une image contenant texte, carte&#10;&#10;Description générée automatiquement">
+            <a:extLst>
+              <a:ext uri="{FF2B5EF4-FFF2-40B4-BE49-F238E27FC236}">
+                <a16:creationId xmlns:a16="http://schemas.microsoft.com/office/drawing/2014/main" id="{E1C53708-E90B-4772-8A31-F5D738AC58B7}"/>
+              </a:ext>
+            </a:extLst>
+          </p:cNvPr>
+          <p:cNvPicPr>
+            <a:picLocks noGrp="1"/>
+          </p:cNvPicPr>
+          <p:nvPr>
+            <p:ph idx="1"/>
+          </p:nvPr>
+        </p:nvPicPr>
+        <p:blipFill>
+          <a:blip r:embed="rId6">
+            <a:extLst>
+              <a:ext uri="{28A0092B-C50C-407E-A947-70E740481C1C}">
+                <a14:useLocalDpi xmlns:a14="http://schemas.microsoft.com/office/drawing/2010/main" val="0"/>
+              </a:ext>
+            </a:extLst>
+          </a:blip>
+          <a:stretch>
+            <a:fillRect/>
+          </a:stretch>
+        </p:blipFill>
+        <p:spPr>
+          <a:xfrm>
+            <a:off x="5823765" y="609602"/>
+            <a:ext cx="5322330" cy="5587749"/>
+          </a:xfrm>
+          <a:prstGeom prst="rect">
+            <a:avLst/>
+          </a:prstGeom>
+        </p:spPr>
+      </p:pic>
     </p:spTree>
     <p:extLst>
       <p:ext uri="{BB962C8B-B14F-4D97-AF65-F5344CB8AC3E}">
@@ -9631,6 +10778,783 @@
   <p:transition spd="slow">
     <p:wipe/>
   </p:transition>
+  <p:timing>
+    <p:tnLst>
+      <p:par>
+        <p:cTn id="1" dur="indefinite" restart="never" nodeType="tmRoot">
+          <p:childTnLst>
+            <p:seq concurrent="1" nextAc="seek">
+              <p:cTn id="2" dur="indefinite" nodeType="mainSeq">
+                <p:childTnLst>
+                  <p:par>
+                    <p:cTn id="3" fill="hold">
+                      <p:stCondLst>
+                        <p:cond delay="indefinite"/>
+                      </p:stCondLst>
+                      <p:childTnLst>
+                        <p:par>
+                          <p:cTn id="4" fill="hold">
+                            <p:stCondLst>
+                              <p:cond delay="0"/>
+                            </p:stCondLst>
+                            <p:childTnLst>
+                              <p:par>
+                                <p:cTn id="5" presetID="1" presetClass="entr" presetSubtype="0" fill="hold" grpId="0" nodeType="clickEffect">
+                                  <p:stCondLst>
+                                    <p:cond delay="0"/>
+                                  </p:stCondLst>
+                                  <p:childTnLst>
+                                    <p:set>
+                                      <p:cBhvr>
+                                        <p:cTn id="6" dur="1" fill="hold">
+                                          <p:stCondLst>
+                                            <p:cond delay="0"/>
+                                          </p:stCondLst>
+                                        </p:cTn>
+                                        <p:tgtEl>
+                                          <p:spTgt spid="4">
+                                            <p:txEl>
+                                              <p:pRg st="0" end="0"/>
+                                            </p:txEl>
+                                          </p:spTgt>
+                                        </p:tgtEl>
+                                        <p:attrNameLst>
+                                          <p:attrName>style.visibility</p:attrName>
+                                        </p:attrNameLst>
+                                      </p:cBhvr>
+                                      <p:to>
+                                        <p:strVal val="visible"/>
+                                      </p:to>
+                                    </p:set>
+                                  </p:childTnLst>
+                                </p:cTn>
+                              </p:par>
+                            </p:childTnLst>
+                          </p:cTn>
+                        </p:par>
+                      </p:childTnLst>
+                    </p:cTn>
+                  </p:par>
+                  <p:par>
+                    <p:cTn id="7" fill="hold">
+                      <p:stCondLst>
+                        <p:cond delay="indefinite"/>
+                      </p:stCondLst>
+                      <p:childTnLst>
+                        <p:par>
+                          <p:cTn id="8" fill="hold">
+                            <p:stCondLst>
+                              <p:cond delay="0"/>
+                            </p:stCondLst>
+                            <p:childTnLst>
+                              <p:par>
+                                <p:cTn id="9" presetID="1" presetClass="entr" presetSubtype="0" fill="hold" grpId="0" nodeType="clickEffect">
+                                  <p:stCondLst>
+                                    <p:cond delay="0"/>
+                                  </p:stCondLst>
+                                  <p:childTnLst>
+                                    <p:set>
+                                      <p:cBhvr>
+                                        <p:cTn id="10" dur="1" fill="hold">
+                                          <p:stCondLst>
+                                            <p:cond delay="0"/>
+                                          </p:stCondLst>
+                                        </p:cTn>
+                                        <p:tgtEl>
+                                          <p:spTgt spid="4">
+                                            <p:txEl>
+                                              <p:pRg st="1" end="1"/>
+                                            </p:txEl>
+                                          </p:spTgt>
+                                        </p:tgtEl>
+                                        <p:attrNameLst>
+                                          <p:attrName>style.visibility</p:attrName>
+                                        </p:attrNameLst>
+                                      </p:cBhvr>
+                                      <p:to>
+                                        <p:strVal val="visible"/>
+                                      </p:to>
+                                    </p:set>
+                                  </p:childTnLst>
+                                </p:cTn>
+                              </p:par>
+                            </p:childTnLst>
+                          </p:cTn>
+                        </p:par>
+                      </p:childTnLst>
+                    </p:cTn>
+                  </p:par>
+                  <p:par>
+                    <p:cTn id="11" fill="hold">
+                      <p:stCondLst>
+                        <p:cond delay="indefinite"/>
+                      </p:stCondLst>
+                      <p:childTnLst>
+                        <p:par>
+                          <p:cTn id="12" fill="hold">
+                            <p:stCondLst>
+                              <p:cond delay="0"/>
+                            </p:stCondLst>
+                            <p:childTnLst>
+                              <p:par>
+                                <p:cTn id="13" presetID="1" presetClass="entr" presetSubtype="0" fill="hold" grpId="0" nodeType="clickEffect">
+                                  <p:stCondLst>
+                                    <p:cond delay="0"/>
+                                  </p:stCondLst>
+                                  <p:childTnLst>
+                                    <p:set>
+                                      <p:cBhvr>
+                                        <p:cTn id="14" dur="1" fill="hold">
+                                          <p:stCondLst>
+                                            <p:cond delay="0"/>
+                                          </p:stCondLst>
+                                        </p:cTn>
+                                        <p:tgtEl>
+                                          <p:spTgt spid="4">
+                                            <p:txEl>
+                                              <p:pRg st="2" end="2"/>
+                                            </p:txEl>
+                                          </p:spTgt>
+                                        </p:tgtEl>
+                                        <p:attrNameLst>
+                                          <p:attrName>style.visibility</p:attrName>
+                                        </p:attrNameLst>
+                                      </p:cBhvr>
+                                      <p:to>
+                                        <p:strVal val="visible"/>
+                                      </p:to>
+                                    </p:set>
+                                  </p:childTnLst>
+                                </p:cTn>
+                              </p:par>
+                            </p:childTnLst>
+                          </p:cTn>
+                        </p:par>
+                      </p:childTnLst>
+                    </p:cTn>
+                  </p:par>
+                  <p:par>
+                    <p:cTn id="15" fill="hold">
+                      <p:stCondLst>
+                        <p:cond delay="indefinite"/>
+                      </p:stCondLst>
+                      <p:childTnLst>
+                        <p:par>
+                          <p:cTn id="16" fill="hold">
+                            <p:stCondLst>
+                              <p:cond delay="0"/>
+                            </p:stCondLst>
+                            <p:childTnLst>
+                              <p:par>
+                                <p:cTn id="17" presetID="1" presetClass="entr" presetSubtype="0" fill="hold" grpId="0" nodeType="clickEffect">
+                                  <p:stCondLst>
+                                    <p:cond delay="0"/>
+                                  </p:stCondLst>
+                                  <p:childTnLst>
+                                    <p:set>
+                                      <p:cBhvr>
+                                        <p:cTn id="18" dur="1" fill="hold">
+                                          <p:stCondLst>
+                                            <p:cond delay="0"/>
+                                          </p:stCondLst>
+                                        </p:cTn>
+                                        <p:tgtEl>
+                                          <p:spTgt spid="4">
+                                            <p:txEl>
+                                              <p:pRg st="3" end="3"/>
+                                            </p:txEl>
+                                          </p:spTgt>
+                                        </p:tgtEl>
+                                        <p:attrNameLst>
+                                          <p:attrName>style.visibility</p:attrName>
+                                        </p:attrNameLst>
+                                      </p:cBhvr>
+                                      <p:to>
+                                        <p:strVal val="visible"/>
+                                      </p:to>
+                                    </p:set>
+                                  </p:childTnLst>
+                                </p:cTn>
+                              </p:par>
+                            </p:childTnLst>
+                          </p:cTn>
+                        </p:par>
+                      </p:childTnLst>
+                    </p:cTn>
+                  </p:par>
+                  <p:par>
+                    <p:cTn id="19" fill="hold">
+                      <p:stCondLst>
+                        <p:cond delay="indefinite"/>
+                      </p:stCondLst>
+                      <p:childTnLst>
+                        <p:par>
+                          <p:cTn id="20" fill="hold">
+                            <p:stCondLst>
+                              <p:cond delay="0"/>
+                            </p:stCondLst>
+                            <p:childTnLst>
+                              <p:par>
+                                <p:cTn id="21" presetID="1" presetClass="entr" presetSubtype="0" fill="hold" nodeType="clickEffect">
+                                  <p:stCondLst>
+                                    <p:cond delay="0"/>
+                                  </p:stCondLst>
+                                  <p:childTnLst>
+                                    <p:set>
+                                      <p:cBhvr>
+                                        <p:cTn id="22" dur="1" fill="hold">
+                                          <p:stCondLst>
+                                            <p:cond delay="0"/>
+                                          </p:stCondLst>
+                                        </p:cTn>
+                                        <p:tgtEl>
+                                          <p:spTgt spid="5"/>
+                                        </p:tgtEl>
+                                        <p:attrNameLst>
+                                          <p:attrName>style.visibility</p:attrName>
+                                        </p:attrNameLst>
+                                      </p:cBhvr>
+                                      <p:to>
+                                        <p:strVal val="visible"/>
+                                      </p:to>
+                                    </p:set>
+                                  </p:childTnLst>
+                                </p:cTn>
+                              </p:par>
+                            </p:childTnLst>
+                          </p:cTn>
+                        </p:par>
+                      </p:childTnLst>
+                    </p:cTn>
+                  </p:par>
+                </p:childTnLst>
+              </p:cTn>
+              <p:prevCondLst>
+                <p:cond evt="onPrev" delay="0">
+                  <p:tgtEl>
+                    <p:sldTgt/>
+                  </p:tgtEl>
+                </p:cond>
+              </p:prevCondLst>
+              <p:nextCondLst>
+                <p:cond evt="onNext" delay="0">
+                  <p:tgtEl>
+                    <p:sldTgt/>
+                  </p:tgtEl>
+                </p:cond>
+              </p:nextCondLst>
+            </p:seq>
+          </p:childTnLst>
+        </p:cTn>
+      </p:par>
+    </p:tnLst>
+    <p:bldLst>
+      <p:bldP spid="4" grpId="0" build="p"/>
+    </p:bldLst>
+  </p:timing>
+</p:sld>
+</file>
+
+<file path=ppt/slides/slide12.xml><?xml version="1.0" encoding="utf-8"?>
+<p:sld xmlns:a="http://schemas.openxmlformats.org/drawingml/2006/main" xmlns:r="http://schemas.openxmlformats.org/officeDocument/2006/relationships" xmlns:p="http://schemas.openxmlformats.org/presentationml/2006/main">
+  <p:cSld>
+    <p:spTree>
+      <p:nvGrpSpPr>
+        <p:cNvPr id="1" name=""/>
+        <p:cNvGrpSpPr/>
+        <p:nvPr/>
+      </p:nvGrpSpPr>
+      <p:grpSpPr>
+        <a:xfrm>
+          <a:off x="0" y="0"/>
+          <a:ext cx="0" cy="0"/>
+          <a:chOff x="0" y="0"/>
+          <a:chExt cx="0" cy="0"/>
+        </a:xfrm>
+      </p:grpSpPr>
+      <p:sp>
+        <p:nvSpPr>
+          <p:cNvPr id="2" name="Titre 1">
+            <a:extLst>
+              <a:ext uri="{FF2B5EF4-FFF2-40B4-BE49-F238E27FC236}">
+                <a16:creationId xmlns:a16="http://schemas.microsoft.com/office/drawing/2014/main" id="{C48B78EB-3514-4DA2-B814-89517B52831D}"/>
+              </a:ext>
+            </a:extLst>
+          </p:cNvPr>
+          <p:cNvSpPr>
+            <a:spLocks noGrp="1"/>
+          </p:cNvSpPr>
+          <p:nvPr>
+            <p:ph type="title"/>
+          </p:nvPr>
+        </p:nvSpPr>
+        <p:spPr/>
+        <p:txBody>
+          <a:bodyPr/>
+          <a:lstStyle/>
+          <a:p>
+            <a:r>
+              <a:rPr lang="fr-FR" dirty="0"/>
+              <a:t>Comment se comportent les méthodes lorsqu’il y a du mouvement ? </a:t>
+            </a:r>
+          </a:p>
+        </p:txBody>
+      </p:sp>
+      <p:pic>
+        <p:nvPicPr>
+          <p:cNvPr id="6" name="Espace réservé du contenu 5">
+            <a:extLst>
+              <a:ext uri="{FF2B5EF4-FFF2-40B4-BE49-F238E27FC236}">
+                <a16:creationId xmlns:a16="http://schemas.microsoft.com/office/drawing/2014/main" id="{FC1E1CC7-217C-421F-98D8-273CB8C7127F}"/>
+              </a:ext>
+            </a:extLst>
+          </p:cNvPr>
+          <p:cNvPicPr>
+            <a:picLocks noGrp="1" noChangeAspect="1"/>
+          </p:cNvPicPr>
+          <p:nvPr>
+            <p:ph idx="1"/>
+          </p:nvPr>
+        </p:nvPicPr>
+        <p:blipFill>
+          <a:blip r:embed="rId3"/>
+          <a:stretch>
+            <a:fillRect/>
+          </a:stretch>
+        </p:blipFill>
+        <p:spPr>
+          <a:xfrm>
+            <a:off x="5418138" y="1377554"/>
+            <a:ext cx="5470525" cy="4102893"/>
+          </a:xfrm>
+        </p:spPr>
+      </p:pic>
+      <p:sp>
+        <p:nvSpPr>
+          <p:cNvPr id="4" name="Espace réservé du texte 3">
+            <a:extLst>
+              <a:ext uri="{FF2B5EF4-FFF2-40B4-BE49-F238E27FC236}">
+                <a16:creationId xmlns:a16="http://schemas.microsoft.com/office/drawing/2014/main" id="{8A5B3709-E012-42C1-ACD9-B531AD44BA83}"/>
+              </a:ext>
+            </a:extLst>
+          </p:cNvPr>
+          <p:cNvSpPr>
+            <a:spLocks noGrp="1"/>
+          </p:cNvSpPr>
+          <p:nvPr>
+            <p:ph type="body" sz="half" idx="2"/>
+          </p:nvPr>
+        </p:nvSpPr>
+        <p:spPr/>
+        <p:txBody>
+          <a:bodyPr/>
+          <a:lstStyle/>
+          <a:p>
+            <a:pPr marL="285750" indent="-285750">
+              <a:buFont typeface="Arial" panose="020B0604020202020204" pitchFamily="34" charset="0"/>
+              <a:buChar char="•"/>
+            </a:pPr>
+            <a:r>
+              <a:rPr lang="fr-FR" dirty="0"/>
+              <a:t>Il faut d’abord simuler le mouvement</a:t>
+            </a:r>
+          </a:p>
+          <a:p>
+            <a:pPr marL="285750" indent="-285750">
+              <a:buFont typeface="Arial" panose="020B0604020202020204" pitchFamily="34" charset="0"/>
+              <a:buChar char="•"/>
+            </a:pPr>
+            <a:endParaRPr lang="fr-FR" dirty="0"/>
+          </a:p>
+          <a:p>
+            <a:pPr marL="285750" indent="-285750">
+              <a:buFont typeface="Arial" panose="020B0604020202020204" pitchFamily="34" charset="0"/>
+              <a:buChar char="•"/>
+            </a:pPr>
+            <a:r>
+              <a:rPr lang="fr-FR" dirty="0"/>
+              <a:t>On va simplement appliquer ce que l’on a fait précédemment plusieurs fois</a:t>
+            </a:r>
+          </a:p>
+          <a:p>
+            <a:pPr marL="285750" indent="-285750">
+              <a:buFont typeface="Arial" panose="020B0604020202020204" pitchFamily="34" charset="0"/>
+              <a:buChar char="•"/>
+            </a:pPr>
+            <a:endParaRPr lang="fr-FR" dirty="0"/>
+          </a:p>
+          <a:p>
+            <a:pPr marL="285750" indent="-285750">
+              <a:buFont typeface="Arial" panose="020B0604020202020204" pitchFamily="34" charset="0"/>
+              <a:buChar char="•"/>
+            </a:pPr>
+            <a:r>
+              <a:rPr lang="fr-FR" dirty="0"/>
+              <a:t>On va partir d’un mouvement simple</a:t>
+            </a:r>
+          </a:p>
+        </p:txBody>
+      </p:sp>
+    </p:spTree>
+    <p:extLst>
+      <p:ext uri="{BB962C8B-B14F-4D97-AF65-F5344CB8AC3E}">
+        <p14:creationId xmlns:p14="http://schemas.microsoft.com/office/powerpoint/2010/main" val="3085823411"/>
+      </p:ext>
+    </p:extLst>
+  </p:cSld>
+  <p:clrMapOvr>
+    <a:masterClrMapping/>
+  </p:clrMapOvr>
+  <p:transition spd="slow">
+    <p:wipe/>
+  </p:transition>
+  <p:timing>
+    <p:tnLst>
+      <p:par>
+        <p:cTn id="1" dur="indefinite" restart="never" nodeType="tmRoot">
+          <p:childTnLst>
+            <p:seq concurrent="1" nextAc="seek">
+              <p:cTn id="2" dur="indefinite" nodeType="mainSeq">
+                <p:childTnLst>
+                  <p:par>
+                    <p:cTn id="3" fill="hold">
+                      <p:stCondLst>
+                        <p:cond delay="indefinite"/>
+                      </p:stCondLst>
+                      <p:childTnLst>
+                        <p:par>
+                          <p:cTn id="4" fill="hold">
+                            <p:stCondLst>
+                              <p:cond delay="0"/>
+                            </p:stCondLst>
+                            <p:childTnLst>
+                              <p:par>
+                                <p:cTn id="5" presetID="1" presetClass="entr" presetSubtype="0" fill="hold" nodeType="clickEffect">
+                                  <p:stCondLst>
+                                    <p:cond delay="0"/>
+                                  </p:stCondLst>
+                                  <p:childTnLst>
+                                    <p:set>
+                                      <p:cBhvr>
+                                        <p:cTn id="6" dur="1" fill="hold">
+                                          <p:stCondLst>
+                                            <p:cond delay="0"/>
+                                          </p:stCondLst>
+                                        </p:cTn>
+                                        <p:tgtEl>
+                                          <p:spTgt spid="6"/>
+                                        </p:tgtEl>
+                                        <p:attrNameLst>
+                                          <p:attrName>style.visibility</p:attrName>
+                                        </p:attrNameLst>
+                                      </p:cBhvr>
+                                      <p:to>
+                                        <p:strVal val="visible"/>
+                                      </p:to>
+                                    </p:set>
+                                  </p:childTnLst>
+                                </p:cTn>
+                              </p:par>
+                            </p:childTnLst>
+                          </p:cTn>
+                        </p:par>
+                      </p:childTnLst>
+                    </p:cTn>
+                  </p:par>
+                </p:childTnLst>
+              </p:cTn>
+              <p:prevCondLst>
+                <p:cond evt="onPrev" delay="0">
+                  <p:tgtEl>
+                    <p:sldTgt/>
+                  </p:tgtEl>
+                </p:cond>
+              </p:prevCondLst>
+              <p:nextCondLst>
+                <p:cond evt="onNext" delay="0">
+                  <p:tgtEl>
+                    <p:sldTgt/>
+                  </p:tgtEl>
+                </p:cond>
+              </p:nextCondLst>
+            </p:seq>
+          </p:childTnLst>
+        </p:cTn>
+      </p:par>
+    </p:tnLst>
+  </p:timing>
+</p:sld>
+</file>
+
+<file path=ppt/slides/slide13.xml><?xml version="1.0" encoding="utf-8"?>
+<p:sld xmlns:a="http://schemas.openxmlformats.org/drawingml/2006/main" xmlns:r="http://schemas.openxmlformats.org/officeDocument/2006/relationships" xmlns:p="http://schemas.openxmlformats.org/presentationml/2006/main">
+  <p:cSld>
+    <p:spTree>
+      <p:nvGrpSpPr>
+        <p:cNvPr id="1" name=""/>
+        <p:cNvGrpSpPr/>
+        <p:nvPr/>
+      </p:nvGrpSpPr>
+      <p:grpSpPr>
+        <a:xfrm>
+          <a:off x="0" y="0"/>
+          <a:ext cx="0" cy="0"/>
+          <a:chOff x="0" y="0"/>
+          <a:chExt cx="0" cy="0"/>
+        </a:xfrm>
+      </p:grpSpPr>
+      <p:sp>
+        <p:nvSpPr>
+          <p:cNvPr id="2" name="Titre 1">
+            <a:extLst>
+              <a:ext uri="{FF2B5EF4-FFF2-40B4-BE49-F238E27FC236}">
+                <a16:creationId xmlns:a16="http://schemas.microsoft.com/office/drawing/2014/main" id="{0E974D46-E076-47C5-B178-1EFAC06D0C2F}"/>
+              </a:ext>
+            </a:extLst>
+          </p:cNvPr>
+          <p:cNvSpPr>
+            <a:spLocks noGrp="1"/>
+          </p:cNvSpPr>
+          <p:nvPr>
+            <p:ph type="title"/>
+          </p:nvPr>
+        </p:nvSpPr>
+        <p:spPr/>
+        <p:txBody>
+          <a:bodyPr/>
+          <a:lstStyle/>
+          <a:p>
+            <a:r>
+              <a:rPr lang="fr-FR" dirty="0"/>
+              <a:t>Evolution des angles au cours du temps</a:t>
+            </a:r>
+          </a:p>
+        </p:txBody>
+      </p:sp>
+      <p:sp>
+        <p:nvSpPr>
+          <p:cNvPr id="4" name="Espace réservé du texte 3">
+            <a:extLst>
+              <a:ext uri="{FF2B5EF4-FFF2-40B4-BE49-F238E27FC236}">
+                <a16:creationId xmlns:a16="http://schemas.microsoft.com/office/drawing/2014/main" id="{0D61EA00-A462-462F-B969-CE6B36EF6607}"/>
+              </a:ext>
+            </a:extLst>
+          </p:cNvPr>
+          <p:cNvSpPr>
+            <a:spLocks noGrp="1"/>
+          </p:cNvSpPr>
+          <p:nvPr>
+            <p:ph type="body" sz="half" idx="2"/>
+          </p:nvPr>
+        </p:nvSpPr>
+        <p:spPr/>
+        <p:txBody>
+          <a:bodyPr/>
+          <a:lstStyle/>
+          <a:p>
+            <a:pPr marL="285750" indent="-285750">
+              <a:buFontTx/>
+              <a:buChar char="-"/>
+            </a:pPr>
+            <a:r>
+              <a:rPr lang="fr-FR" dirty="0"/>
+              <a:t>Faire en sorte que les sources soient superposées</a:t>
+            </a:r>
+          </a:p>
+          <a:p>
+            <a:pPr marL="285750" indent="-285750">
+              <a:buFontTx/>
+              <a:buChar char="-"/>
+            </a:pPr>
+            <a:endParaRPr lang="fr-FR" dirty="0"/>
+          </a:p>
+          <a:p>
+            <a:pPr marL="285750" indent="-285750">
+              <a:buFontTx/>
+              <a:buChar char="-"/>
+            </a:pPr>
+            <a:r>
+              <a:rPr lang="fr-FR" dirty="0"/>
+              <a:t>Voir ce qu’il se passe si les sources sont trop proches</a:t>
+            </a:r>
+          </a:p>
+          <a:p>
+            <a:pPr marL="285750" indent="-285750">
+              <a:buFontTx/>
+              <a:buChar char="-"/>
+            </a:pPr>
+            <a:endParaRPr lang="fr-FR" dirty="0"/>
+          </a:p>
+          <a:p>
+            <a:pPr marL="285750" indent="-285750">
+              <a:buFontTx/>
+              <a:buChar char="-"/>
+            </a:pPr>
+            <a:endParaRPr lang="fr-FR" dirty="0"/>
+          </a:p>
+        </p:txBody>
+      </p:sp>
+      <p:pic>
+        <p:nvPicPr>
+          <p:cNvPr id="1026" name="Picture 2">
+            <a:extLst>
+              <a:ext uri="{FF2B5EF4-FFF2-40B4-BE49-F238E27FC236}">
+                <a16:creationId xmlns:a16="http://schemas.microsoft.com/office/drawing/2014/main" id="{8A38F5C6-DA9E-457D-AE32-4C74633BD968}"/>
+              </a:ext>
+            </a:extLst>
+          </p:cNvPr>
+          <p:cNvPicPr>
+            <a:picLocks noGrp="1" noChangeAspect="1" noChangeArrowheads="1"/>
+          </p:cNvPicPr>
+          <p:nvPr>
+            <p:ph idx="1"/>
+          </p:nvPr>
+        </p:nvPicPr>
+        <p:blipFill>
+          <a:blip r:embed="rId3">
+            <a:extLst>
+              <a:ext uri="{28A0092B-C50C-407E-A947-70E740481C1C}">
+                <a14:useLocalDpi xmlns:a14="http://schemas.microsoft.com/office/drawing/2010/main" val="0"/>
+              </a:ext>
+            </a:extLst>
+          </a:blip>
+          <a:srcRect/>
+          <a:stretch>
+            <a:fillRect/>
+          </a:stretch>
+        </p:blipFill>
+        <p:spPr bwMode="auto">
+          <a:xfrm>
+            <a:off x="5707063" y="982663"/>
+            <a:ext cx="4892675" cy="4892675"/>
+          </a:xfrm>
+          <a:prstGeom prst="rect">
+            <a:avLst/>
+          </a:prstGeom>
+          <a:noFill/>
+          <a:extLst>
+            <a:ext uri="{909E8E84-426E-40DD-AFC4-6F175D3DCCD1}">
+              <a14:hiddenFill xmlns:a14="http://schemas.microsoft.com/office/drawing/2010/main">
+                <a:solidFill>
+                  <a:srgbClr val="FFFFFF"/>
+                </a:solidFill>
+              </a14:hiddenFill>
+            </a:ext>
+          </a:extLst>
+        </p:spPr>
+      </p:pic>
+    </p:spTree>
+    <p:extLst>
+      <p:ext uri="{BB962C8B-B14F-4D97-AF65-F5344CB8AC3E}">
+        <p14:creationId xmlns:p14="http://schemas.microsoft.com/office/powerpoint/2010/main" val="3896122733"/>
+      </p:ext>
+    </p:extLst>
+  </p:cSld>
+  <p:clrMapOvr>
+    <a:masterClrMapping/>
+  </p:clrMapOvr>
+  <p:transition spd="slow">
+    <p:wipe/>
+  </p:transition>
+</p:sld>
+</file>
+
+<file path=ppt/slides/slide14.xml><?xml version="1.0" encoding="utf-8"?>
+<p:sld xmlns:a="http://schemas.openxmlformats.org/drawingml/2006/main" xmlns:r="http://schemas.openxmlformats.org/officeDocument/2006/relationships" xmlns:p="http://schemas.openxmlformats.org/presentationml/2006/main">
+  <p:cSld>
+    <p:spTree>
+      <p:nvGrpSpPr>
+        <p:cNvPr id="1" name=""/>
+        <p:cNvGrpSpPr/>
+        <p:nvPr/>
+      </p:nvGrpSpPr>
+      <p:grpSpPr>
+        <a:xfrm>
+          <a:off x="0" y="0"/>
+          <a:ext cx="0" cy="0"/>
+          <a:chOff x="0" y="0"/>
+          <a:chExt cx="0" cy="0"/>
+        </a:xfrm>
+      </p:grpSpPr>
+      <p:sp>
+        <p:nvSpPr>
+          <p:cNvPr id="2" name="Titre 1">
+            <a:extLst>
+              <a:ext uri="{FF2B5EF4-FFF2-40B4-BE49-F238E27FC236}">
+                <a16:creationId xmlns:a16="http://schemas.microsoft.com/office/drawing/2014/main" id="{2FB9B3CB-8626-492B-800A-9F905FFB3D0C}"/>
+              </a:ext>
+            </a:extLst>
+          </p:cNvPr>
+          <p:cNvSpPr>
+            <a:spLocks noGrp="1"/>
+          </p:cNvSpPr>
+          <p:nvPr>
+            <p:ph type="title"/>
+          </p:nvPr>
+        </p:nvSpPr>
+        <p:spPr>
+          <a:xfrm>
+            <a:off x="1393935" y="1681655"/>
+            <a:ext cx="9404129" cy="604344"/>
+          </a:xfrm>
+        </p:spPr>
+        <p:txBody>
+          <a:bodyPr>
+            <a:normAutofit fontScale="90000"/>
+          </a:bodyPr>
+          <a:lstStyle/>
+          <a:p>
+            <a:r>
+              <a:rPr lang="fr-FR" dirty="0"/>
+              <a:t>Largeur et mi-hauteur et résolution spatiale</a:t>
+            </a:r>
+          </a:p>
+        </p:txBody>
+      </p:sp>
+      <p:pic>
+        <p:nvPicPr>
+          <p:cNvPr id="7" name="Image 6">
+            <a:extLst>
+              <a:ext uri="{FF2B5EF4-FFF2-40B4-BE49-F238E27FC236}">
+                <a16:creationId xmlns:a16="http://schemas.microsoft.com/office/drawing/2014/main" id="{CA64B727-BF13-4237-BF03-A2251D2DC29F}"/>
+              </a:ext>
+            </a:extLst>
+          </p:cNvPr>
+          <p:cNvPicPr/>
+          <p:nvPr/>
+        </p:nvPicPr>
+        <p:blipFill>
+          <a:blip r:embed="rId3" cstate="print">
+            <a:extLst>
+              <a:ext uri="{28A0092B-C50C-407E-A947-70E740481C1C}">
+                <a14:useLocalDpi xmlns:a14="http://schemas.microsoft.com/office/drawing/2010/main" val="0"/>
+              </a:ext>
+            </a:extLst>
+          </a:blip>
+          <a:stretch>
+            <a:fillRect/>
+          </a:stretch>
+        </p:blipFill>
+        <p:spPr>
+          <a:xfrm>
+            <a:off x="3665209" y="2937350"/>
+            <a:ext cx="4861582" cy="3269302"/>
+          </a:xfrm>
+          <a:prstGeom prst="rect">
+            <a:avLst/>
+          </a:prstGeom>
+        </p:spPr>
+      </p:pic>
+    </p:spTree>
+    <p:extLst>
+      <p:ext uri="{BB962C8B-B14F-4D97-AF65-F5344CB8AC3E}">
+        <p14:creationId xmlns:p14="http://schemas.microsoft.com/office/powerpoint/2010/main" val="1905760650"/>
+      </p:ext>
+    </p:extLst>
+  </p:cSld>
+  <p:clrMapOvr>
+    <a:masterClrMapping/>
+  </p:clrMapOvr>
 </p:sld>
 </file>
 

</xml_diff>

<commit_message>
Dernier pas avant la soutenance
</commit_message>
<xml_diff>
--- a/Soutenance.pptx
+++ b/Soutenance.pptx
@@ -5,7 +5,7 @@
     <p:sldMasterId id="2147483648" r:id="rId1"/>
   </p:sldMasterIdLst>
   <p:notesMasterIdLst>
-    <p:notesMasterId r:id="rId16"/>
+    <p:notesMasterId r:id="rId18"/>
   </p:notesMasterIdLst>
   <p:sldIdLst>
     <p:sldId id="256" r:id="rId2"/>
@@ -22,6 +22,8 @@
     <p:sldId id="267" r:id="rId13"/>
     <p:sldId id="268" r:id="rId14"/>
     <p:sldId id="269" r:id="rId15"/>
+    <p:sldId id="270" r:id="rId16"/>
+    <p:sldId id="271" r:id="rId17"/>
   </p:sldIdLst>
   <p:sldSz cx="12192000" cy="6858000"/>
   <p:notesSz cx="6858000" cy="9144000"/>
@@ -210,7 +212,7 @@
           <a:p>
             <a:fld id="{1C4918F8-3781-C942-9B1B-713CC283EA91}" type="datetimeFigureOut">
               <a:rPr lang="fr-FR" smtClean="0"/>
-              <a:t>03/11/2020</a:t>
+              <a:t>04/11/2020</a:t>
             </a:fld>
             <a:endParaRPr lang="fr-FR"/>
           </a:p>
@@ -532,7 +534,15 @@
           <a:p>
             <a:r>
               <a:rPr lang="fr-FR" dirty="0"/>
-              <a:t>- Expliquer mon projet professionnel, mais aussi ce qui m’a amené à vouloir aller à l’ERM</a:t>
+              <a:t>- Expliquer mon projet professionnel (guerre </a:t>
+            </a:r>
+            <a:r>
+              <a:rPr lang="fr-FR" dirty="0" err="1"/>
+              <a:t>electronique</a:t>
+            </a:r>
+            <a:r>
+              <a:rPr lang="fr-FR" dirty="0"/>
+              <a:t>, RADAR, application au contexte opérationnel), mais aussi ce qui m’a amené à vouloir aller à l’ERM ( Similitude à l’ENSTA ) </a:t>
             </a:r>
           </a:p>
           <a:p>
@@ -1354,6 +1364,243 @@
     <p:extLst>
       <p:ext uri="{BB962C8B-B14F-4D97-AF65-F5344CB8AC3E}">
         <p14:creationId xmlns:p14="http://schemas.microsoft.com/office/powerpoint/2010/main" val="1499995410"/>
+      </p:ext>
+    </p:extLst>
+  </p:cSld>
+  <p:clrMapOvr>
+    <a:masterClrMapping/>
+  </p:clrMapOvr>
+</p:notes>
+</file>
+
+<file path=ppt/notesSlides/notesSlide15.xml><?xml version="1.0" encoding="utf-8"?>
+<p:notes xmlns:a="http://schemas.openxmlformats.org/drawingml/2006/main" xmlns:r="http://schemas.openxmlformats.org/officeDocument/2006/relationships" xmlns:p="http://schemas.openxmlformats.org/presentationml/2006/main">
+  <p:cSld>
+    <p:spTree>
+      <p:nvGrpSpPr>
+        <p:cNvPr id="1" name=""/>
+        <p:cNvGrpSpPr/>
+        <p:nvPr/>
+      </p:nvGrpSpPr>
+      <p:grpSpPr>
+        <a:xfrm>
+          <a:off x="0" y="0"/>
+          <a:ext cx="0" cy="0"/>
+          <a:chOff x="0" y="0"/>
+          <a:chExt cx="0" cy="0"/>
+        </a:xfrm>
+      </p:grpSpPr>
+      <p:sp>
+        <p:nvSpPr>
+          <p:cNvPr id="2" name="Espace réservé de l'image des diapositives 1"/>
+          <p:cNvSpPr>
+            <a:spLocks noGrp="1" noRot="1" noChangeAspect="1"/>
+          </p:cNvSpPr>
+          <p:nvPr>
+            <p:ph type="sldImg"/>
+          </p:nvPr>
+        </p:nvSpPr>
+        <p:spPr/>
+      </p:sp>
+      <p:sp>
+        <p:nvSpPr>
+          <p:cNvPr id="3" name="Espace réservé des notes 2"/>
+          <p:cNvSpPr>
+            <a:spLocks noGrp="1"/>
+          </p:cNvSpPr>
+          <p:nvPr>
+            <p:ph type="body" idx="1"/>
+          </p:nvPr>
+        </p:nvSpPr>
+        <p:spPr/>
+        <p:txBody>
+          <a:bodyPr/>
+          <a:lstStyle/>
+          <a:p>
+            <a:pPr algn="l"/>
+            <a:r>
+              <a:rPr lang="fr-FR" b="1" i="0" dirty="0">
+                <a:solidFill>
+                  <a:srgbClr val="000000"/>
+                </a:solidFill>
+                <a:effectLst/>
+                <a:latin typeface="Helvetica Neue"/>
+              </a:rPr>
+              <a:t>Les deux notebooks précédents illustrent respectivement :</a:t>
+            </a:r>
+          </a:p>
+          <a:p>
+            <a:pPr algn="l">
+              <a:buFont typeface="Arial" panose="020B0604020202020204" pitchFamily="34" charset="0"/>
+              <a:buChar char="•"/>
+            </a:pPr>
+            <a:r>
+              <a:rPr lang="fr-FR" b="0" i="0" dirty="0">
+                <a:solidFill>
+                  <a:srgbClr val="000000"/>
+                </a:solidFill>
+                <a:effectLst/>
+                <a:latin typeface="Helvetica Neue"/>
+              </a:rPr>
+              <a:t>L'estimation de la direction d'arrivée d'un signal et la comparaison de différentes méthodes (Justesse, faux-positif, non-détection, robustesse de la méthode au mouvement)</a:t>
+            </a:r>
+          </a:p>
+          <a:p>
+            <a:pPr algn="l">
+              <a:buFont typeface="Arial" panose="020B0604020202020204" pitchFamily="34" charset="0"/>
+              <a:buChar char="•"/>
+            </a:pPr>
+            <a:r>
+              <a:rPr lang="fr-FR" b="0" i="0" dirty="0">
+                <a:solidFill>
+                  <a:srgbClr val="000000"/>
+                </a:solidFill>
+                <a:effectLst/>
+                <a:latin typeface="Helvetica Neue"/>
+              </a:rPr>
+              <a:t>La mise en place d'une situation s'approchant de la réalité et introduire le principe d'émission dans une certaine direction.</a:t>
+            </a:r>
+          </a:p>
+          <a:p>
+            <a:endParaRPr lang="fr-FR" dirty="0"/>
+          </a:p>
+        </p:txBody>
+      </p:sp>
+      <p:sp>
+        <p:nvSpPr>
+          <p:cNvPr id="4" name="Espace réservé du numéro de diapositive 3"/>
+          <p:cNvSpPr>
+            <a:spLocks noGrp="1"/>
+          </p:cNvSpPr>
+          <p:nvPr>
+            <p:ph type="sldNum" sz="quarter" idx="5"/>
+          </p:nvPr>
+        </p:nvSpPr>
+        <p:spPr/>
+        <p:txBody>
+          <a:bodyPr/>
+          <a:lstStyle/>
+          <a:p>
+            <a:fld id="{946D1AFA-ED8B-B94E-B29F-CABEC407D280}" type="slidenum">
+              <a:rPr lang="fr-FR" smtClean="0"/>
+              <a:t>15</a:t>
+            </a:fld>
+            <a:endParaRPr lang="fr-FR"/>
+          </a:p>
+        </p:txBody>
+      </p:sp>
+    </p:spTree>
+    <p:extLst>
+      <p:ext uri="{BB962C8B-B14F-4D97-AF65-F5344CB8AC3E}">
+        <p14:creationId xmlns:p14="http://schemas.microsoft.com/office/powerpoint/2010/main" val="1728229746"/>
+      </p:ext>
+    </p:extLst>
+  </p:cSld>
+  <p:clrMapOvr>
+    <a:masterClrMapping/>
+  </p:clrMapOvr>
+</p:notes>
+</file>
+
+<file path=ppt/notesSlides/notesSlide16.xml><?xml version="1.0" encoding="utf-8"?>
+<p:notes xmlns:a="http://schemas.openxmlformats.org/drawingml/2006/main" xmlns:r="http://schemas.openxmlformats.org/officeDocument/2006/relationships" xmlns:p="http://schemas.openxmlformats.org/presentationml/2006/main">
+  <p:cSld>
+    <p:spTree>
+      <p:nvGrpSpPr>
+        <p:cNvPr id="1" name=""/>
+        <p:cNvGrpSpPr/>
+        <p:nvPr/>
+      </p:nvGrpSpPr>
+      <p:grpSpPr>
+        <a:xfrm>
+          <a:off x="0" y="0"/>
+          <a:ext cx="0" cy="0"/>
+          <a:chOff x="0" y="0"/>
+          <a:chExt cx="0" cy="0"/>
+        </a:xfrm>
+      </p:grpSpPr>
+      <p:sp>
+        <p:nvSpPr>
+          <p:cNvPr id="2" name="Espace réservé de l'image des diapositives 1"/>
+          <p:cNvSpPr>
+            <a:spLocks noGrp="1" noRot="1" noChangeAspect="1"/>
+          </p:cNvSpPr>
+          <p:nvPr>
+            <p:ph type="sldImg"/>
+          </p:nvPr>
+        </p:nvSpPr>
+        <p:spPr/>
+      </p:sp>
+      <p:sp>
+        <p:nvSpPr>
+          <p:cNvPr id="3" name="Espace réservé des notes 2"/>
+          <p:cNvSpPr>
+            <a:spLocks noGrp="1"/>
+          </p:cNvSpPr>
+          <p:nvPr>
+            <p:ph type="body" idx="1"/>
+          </p:nvPr>
+        </p:nvSpPr>
+        <p:spPr/>
+        <p:txBody>
+          <a:bodyPr/>
+          <a:lstStyle/>
+          <a:p>
+            <a:pPr algn="l">
+              <a:lnSpc>
+                <a:spcPct val="115000"/>
+              </a:lnSpc>
+            </a:pPr>
+            <a:r>
+              <a:rPr lang="fr-FR" sz="1800" dirty="0">
+                <a:effectLst/>
+                <a:latin typeface="Calibri" panose="020F0502020204030204" pitchFamily="34" charset="0"/>
+                <a:ea typeface="Calibri" panose="020F0502020204030204" pitchFamily="34" charset="0"/>
+                <a:cs typeface="Times New Roman" panose="02020603050405020304" pitchFamily="18" charset="0"/>
+              </a:rPr>
+              <a:t>Nous nous rendons bien compte qu’en complexifiant la matrice de covariance R, on obtient plus difficilement les directions d’intérêt. En effet, nous voyons dans un premier temps que l’amplitude des pics n’est pas la même, alors que les sources sont à la même distance. De plus, un troisième pic fait son apparition, et vient potentiellement perturber l’estimation des directions d’intérêt en induisant un faux-positif. </a:t>
+            </a:r>
+          </a:p>
+          <a:p>
+            <a:br>
+              <a:rPr lang="fr-FR" sz="1800" dirty="0">
+                <a:effectLst/>
+                <a:latin typeface="Calibri" panose="020F0502020204030204" pitchFamily="34" charset="0"/>
+                <a:ea typeface="Calibri" panose="020F0502020204030204" pitchFamily="34" charset="0"/>
+                <a:cs typeface="Times New Roman" panose="02020603050405020304" pitchFamily="18" charset="0"/>
+              </a:rPr>
+            </a:br>
+            <a:endParaRPr lang="fr-FR" dirty="0"/>
+          </a:p>
+        </p:txBody>
+      </p:sp>
+      <p:sp>
+        <p:nvSpPr>
+          <p:cNvPr id="4" name="Espace réservé du numéro de diapositive 3"/>
+          <p:cNvSpPr>
+            <a:spLocks noGrp="1"/>
+          </p:cNvSpPr>
+          <p:nvPr>
+            <p:ph type="sldNum" sz="quarter" idx="5"/>
+          </p:nvPr>
+        </p:nvSpPr>
+        <p:spPr/>
+        <p:txBody>
+          <a:bodyPr/>
+          <a:lstStyle/>
+          <a:p>
+            <a:fld id="{946D1AFA-ED8B-B94E-B29F-CABEC407D280}" type="slidenum">
+              <a:rPr lang="fr-FR" smtClean="0"/>
+              <a:t>16</a:t>
+            </a:fld>
+            <a:endParaRPr lang="fr-FR"/>
+          </a:p>
+        </p:txBody>
+      </p:sp>
+    </p:spTree>
+    <p:extLst>
+      <p:ext uri="{BB962C8B-B14F-4D97-AF65-F5344CB8AC3E}">
+        <p14:creationId xmlns:p14="http://schemas.microsoft.com/office/powerpoint/2010/main" val="403921720"/>
       </p:ext>
     </p:extLst>
   </p:cSld>
@@ -2690,7 +2937,7 @@
             <a:fld id="{B61BEF0D-F0BB-DE4B-95CE-6DB70DBA9567}" type="datetimeFigureOut">
               <a:rPr lang="en-US" dirty="0"/>
               <a:pPr/>
-              <a:t>11/3/2020</a:t>
+              <a:t>11/4/2020</a:t>
             </a:fld>
             <a:endParaRPr lang="en-US" dirty="0"/>
           </a:p>
@@ -3011,7 +3258,7 @@
             <a:fld id="{B61BEF0D-F0BB-DE4B-95CE-6DB70DBA9567}" type="datetimeFigureOut">
               <a:rPr lang="en-US" dirty="0"/>
               <a:pPr/>
-              <a:t>11/3/2020</a:t>
+              <a:t>11/4/2020</a:t>
             </a:fld>
             <a:endParaRPr lang="en-US" dirty="0"/>
           </a:p>
@@ -3256,7 +3503,7 @@
             <a:fld id="{B61BEF0D-F0BB-DE4B-95CE-6DB70DBA9567}" type="datetimeFigureOut">
               <a:rPr lang="en-US" dirty="0"/>
               <a:pPr/>
-              <a:t>11/3/2020</a:t>
+              <a:t>11/4/2020</a:t>
             </a:fld>
             <a:endParaRPr lang="en-US" dirty="0"/>
           </a:p>
@@ -3592,7 +3839,7 @@
             <a:fld id="{B61BEF0D-F0BB-DE4B-95CE-6DB70DBA9567}" type="datetimeFigureOut">
               <a:rPr lang="en-US" dirty="0"/>
               <a:pPr/>
-              <a:t>11/3/2020</a:t>
+              <a:t>11/4/2020</a:t>
             </a:fld>
             <a:endParaRPr lang="en-US" dirty="0"/>
           </a:p>
@@ -3936,7 +4183,7 @@
             <a:fld id="{B61BEF0D-F0BB-DE4B-95CE-6DB70DBA9567}" type="datetimeFigureOut">
               <a:rPr lang="en-US" dirty="0"/>
               <a:pPr/>
-              <a:t>11/3/2020</a:t>
+              <a:t>11/4/2020</a:t>
             </a:fld>
             <a:endParaRPr lang="en-US" dirty="0"/>
           </a:p>
@@ -4307,7 +4554,7 @@
             <a:fld id="{B61BEF0D-F0BB-DE4B-95CE-6DB70DBA9567}" type="datetimeFigureOut">
               <a:rPr lang="en-US" dirty="0"/>
               <a:pPr/>
-              <a:t>11/3/2020</a:t>
+              <a:t>11/4/2020</a:t>
             </a:fld>
             <a:endParaRPr lang="en-US" dirty="0"/>
           </a:p>
@@ -4774,7 +5021,7 @@
             <a:fld id="{B61BEF0D-F0BB-DE4B-95CE-6DB70DBA9567}" type="datetimeFigureOut">
               <a:rPr lang="en-US" dirty="0"/>
               <a:pPr/>
-              <a:t>11/3/2020</a:t>
+              <a:t>11/4/2020</a:t>
             </a:fld>
             <a:endParaRPr lang="en-US" dirty="0"/>
           </a:p>
@@ -4976,7 +5223,7 @@
             <a:fld id="{B61BEF0D-F0BB-DE4B-95CE-6DB70DBA9567}" type="datetimeFigureOut">
               <a:rPr lang="en-US" dirty="0"/>
               <a:pPr/>
-              <a:t>11/3/2020</a:t>
+              <a:t>11/4/2020</a:t>
             </a:fld>
             <a:endParaRPr lang="en-US" dirty="0"/>
           </a:p>
@@ -5184,7 +5431,7 @@
             <a:fld id="{B61BEF0D-F0BB-DE4B-95CE-6DB70DBA9567}" type="datetimeFigureOut">
               <a:rPr lang="en-US" dirty="0"/>
               <a:pPr/>
-              <a:t>11/3/2020</a:t>
+              <a:t>11/4/2020</a:t>
             </a:fld>
             <a:endParaRPr lang="en-US" dirty="0"/>
           </a:p>
@@ -5412,7 +5659,7 @@
           <a:p>
             <a:fld id="{52647F38-B617-4D2F-AE0A-013F0C4D2C57}" type="datetimeFigureOut">
               <a:rPr lang="en-US" dirty="0"/>
-              <a:t>11/3/2020</a:t>
+              <a:t>11/4/2020</a:t>
             </a:fld>
             <a:endParaRPr lang="en-US" dirty="0"/>
           </a:p>
@@ -5656,7 +5903,7 @@
             <a:fld id="{B61BEF0D-F0BB-DE4B-95CE-6DB70DBA9567}" type="datetimeFigureOut">
               <a:rPr lang="en-US" dirty="0"/>
               <a:pPr/>
-              <a:t>11/3/2020</a:t>
+              <a:t>11/4/2020</a:t>
             </a:fld>
             <a:endParaRPr lang="en-US" dirty="0"/>
           </a:p>
@@ -5950,7 +6197,7 @@
           <a:p>
             <a:fld id="{05BFA754-D5C3-4E66-96A6-867B257F58DC}" type="datetimeFigureOut">
               <a:rPr lang="en-US" dirty="0"/>
-              <a:t>11/3/2020</a:t>
+              <a:t>11/4/2020</a:t>
             </a:fld>
             <a:endParaRPr lang="en-US" dirty="0"/>
           </a:p>
@@ -6340,7 +6587,7 @@
             <a:fld id="{B61BEF0D-F0BB-DE4B-95CE-6DB70DBA9567}" type="datetimeFigureOut">
               <a:rPr lang="en-US" dirty="0"/>
               <a:pPr/>
-              <a:t>11/3/2020</a:t>
+              <a:t>11/4/2020</a:t>
             </a:fld>
             <a:endParaRPr lang="en-US" dirty="0"/>
           </a:p>
@@ -6486,7 +6733,7 @@
             <a:fld id="{B61BEF0D-F0BB-DE4B-95CE-6DB70DBA9567}" type="datetimeFigureOut">
               <a:rPr lang="en-US" dirty="0"/>
               <a:pPr/>
-              <a:t>11/3/2020</a:t>
+              <a:t>11/4/2020</a:t>
             </a:fld>
             <a:endParaRPr lang="en-US" dirty="0"/>
           </a:p>
@@ -6609,7 +6856,7 @@
             <a:fld id="{B61BEF0D-F0BB-DE4B-95CE-6DB70DBA9567}" type="datetimeFigureOut">
               <a:rPr lang="en-US" dirty="0"/>
               <a:pPr/>
-              <a:t>11/3/2020</a:t>
+              <a:t>11/4/2020</a:t>
             </a:fld>
             <a:endParaRPr lang="en-US" dirty="0"/>
           </a:p>
@@ -6861,7 +7108,7 @@
             <a:fld id="{B61BEF0D-F0BB-DE4B-95CE-6DB70DBA9567}" type="datetimeFigureOut">
               <a:rPr lang="en-US" dirty="0"/>
               <a:pPr/>
-              <a:t>11/3/2020</a:t>
+              <a:t>11/4/2020</a:t>
             </a:fld>
             <a:endParaRPr lang="en-US" dirty="0"/>
           </a:p>
@@ -7173,7 +7420,7 @@
             <a:fld id="{B61BEF0D-F0BB-DE4B-95CE-6DB70DBA9567}" type="datetimeFigureOut">
               <a:rPr lang="en-US" dirty="0"/>
               <a:pPr/>
-              <a:t>11/3/2020</a:t>
+              <a:t>11/4/2020</a:t>
             </a:fld>
             <a:endParaRPr lang="en-US" dirty="0"/>
           </a:p>
@@ -7521,7 +7768,7 @@
             <a:fld id="{B61BEF0D-F0BB-DE4B-95CE-6DB70DBA9567}" type="datetimeFigureOut">
               <a:rPr lang="en-US" dirty="0"/>
               <a:pPr/>
-              <a:t>11/3/2020</a:t>
+              <a:t>11/4/2020</a:t>
             </a:fld>
             <a:endParaRPr lang="en-US" dirty="0"/>
           </a:p>
@@ -11555,6 +11802,624 @@
   <p:clrMapOvr>
     <a:masterClrMapping/>
   </p:clrMapOvr>
+  <p:transition spd="slow">
+    <p:wipe/>
+  </p:transition>
+</p:sld>
+</file>
+
+<file path=ppt/slides/slide15.xml><?xml version="1.0" encoding="utf-8"?>
+<p:sld xmlns:a="http://schemas.openxmlformats.org/drawingml/2006/main" xmlns:r="http://schemas.openxmlformats.org/officeDocument/2006/relationships" xmlns:p="http://schemas.openxmlformats.org/presentationml/2006/main">
+  <p:cSld>
+    <p:spTree>
+      <p:nvGrpSpPr>
+        <p:cNvPr id="1" name=""/>
+        <p:cNvGrpSpPr/>
+        <p:nvPr/>
+      </p:nvGrpSpPr>
+      <p:grpSpPr>
+        <a:xfrm>
+          <a:off x="0" y="0"/>
+          <a:ext cx="0" cy="0"/>
+          <a:chOff x="0" y="0"/>
+          <a:chExt cx="0" cy="0"/>
+        </a:xfrm>
+      </p:grpSpPr>
+      <p:sp>
+        <p:nvSpPr>
+          <p:cNvPr id="2" name="Titre 1">
+            <a:extLst>
+              <a:ext uri="{FF2B5EF4-FFF2-40B4-BE49-F238E27FC236}">
+                <a16:creationId xmlns:a16="http://schemas.microsoft.com/office/drawing/2014/main" id="{84F18207-C1CE-4B1B-A3BA-670067986130}"/>
+              </a:ext>
+            </a:extLst>
+          </p:cNvPr>
+          <p:cNvSpPr>
+            <a:spLocks noGrp="1"/>
+          </p:cNvSpPr>
+          <p:nvPr>
+            <p:ph type="title"/>
+          </p:nvPr>
+        </p:nvSpPr>
+        <p:spPr/>
+        <p:txBody>
+          <a:bodyPr/>
+          <a:lstStyle/>
+          <a:p>
+            <a:r>
+              <a:rPr lang="fr-FR" dirty="0"/>
+              <a:t>Dernier Notebook – </a:t>
+            </a:r>
+            <a:r>
+              <a:rPr lang="fr-FR" dirty="0" err="1"/>
+              <a:t>Simulation.ipynb</a:t>
+            </a:r>
+            <a:endParaRPr lang="fr-FR" dirty="0"/>
+          </a:p>
+        </p:txBody>
+      </p:sp>
+      <p:sp>
+        <p:nvSpPr>
+          <p:cNvPr id="3" name="Espace réservé du texte 2">
+            <a:extLst>
+              <a:ext uri="{FF2B5EF4-FFF2-40B4-BE49-F238E27FC236}">
+                <a16:creationId xmlns:a16="http://schemas.microsoft.com/office/drawing/2014/main" id="{4BF5E3B8-8AE0-47B0-A118-B1D35910FF52}"/>
+              </a:ext>
+            </a:extLst>
+          </p:cNvPr>
+          <p:cNvSpPr>
+            <a:spLocks noGrp="1"/>
+          </p:cNvSpPr>
+          <p:nvPr>
+            <p:ph type="body" idx="1"/>
+          </p:nvPr>
+        </p:nvSpPr>
+        <p:spPr/>
+        <p:txBody>
+          <a:bodyPr/>
+          <a:lstStyle/>
+          <a:p>
+            <a:r>
+              <a:rPr lang="fr-FR" dirty="0"/>
+              <a:t>Contexte</a:t>
+            </a:r>
+          </a:p>
+        </p:txBody>
+      </p:sp>
+      <mc:AlternateContent xmlns:mc="http://schemas.openxmlformats.org/markup-compatibility/2006">
+        <mc:Choice xmlns:a14="http://schemas.microsoft.com/office/drawing/2010/main" Requires="a14">
+          <p:sp>
+            <p:nvSpPr>
+              <p:cNvPr id="4" name="Espace réservé du contenu 3">
+                <a:extLst>
+                  <a:ext uri="{FF2B5EF4-FFF2-40B4-BE49-F238E27FC236}">
+                    <a16:creationId xmlns:a16="http://schemas.microsoft.com/office/drawing/2014/main" id="{2E8CAD63-5268-433B-BE81-6BD3D30E6389}"/>
+                  </a:ext>
+                </a:extLst>
+              </p:cNvPr>
+              <p:cNvSpPr>
+                <a:spLocks noGrp="1"/>
+              </p:cNvSpPr>
+              <p:nvPr>
+                <p:ph sz="half" idx="2"/>
+              </p:nvPr>
+            </p:nvSpPr>
+            <p:spPr/>
+            <p:txBody>
+              <a:bodyPr/>
+              <a:lstStyle/>
+              <a:p>
+                <a:r>
+                  <a:rPr lang="fr-FR" dirty="0"/>
+                  <a:t>Un système mobile, et deux RADAR pour l’éclairer.</a:t>
+                </a:r>
+              </a:p>
+              <a:p>
+                <a:r>
+                  <a:rPr lang="fr-FR" dirty="0" err="1"/>
+                  <a:t>Récéption</a:t>
+                </a:r>
+                <a:r>
+                  <a:rPr lang="fr-FR" dirty="0"/>
+                  <a:t> d’un signal s0, somme des deux signaux des RADAR</a:t>
+                </a:r>
+              </a:p>
+              <a:p>
+                <a:r>
+                  <a:rPr lang="fr-FR" dirty="0"/>
+                  <a:t>Etude de la matrice </a:t>
+                </a:r>
+                <a14:m>
+                  <m:oMath xmlns:m="http://schemas.openxmlformats.org/officeDocument/2006/math">
+                    <m:r>
+                      <a:rPr lang="fr-FR" sz="2000" b="1" i="1" smtClean="0">
+                        <a:effectLst/>
+                        <a:latin typeface="Cambria Math" panose="02040503050406030204" pitchFamily="18" charset="0"/>
+                        <a:ea typeface="Calibri" panose="020F0502020204030204" pitchFamily="34" charset="0"/>
+                        <a:cs typeface="Times New Roman" panose="02020603050405020304" pitchFamily="18" charset="0"/>
+                      </a:rPr>
+                      <m:t>𝐑</m:t>
+                    </m:r>
+                    <m:r>
+                      <a:rPr lang="fr-FR" sz="2000" i="1">
+                        <a:effectLst/>
+                        <a:latin typeface="Cambria Math" panose="02040503050406030204" pitchFamily="18" charset="0"/>
+                        <a:ea typeface="Calibri" panose="020F0502020204030204" pitchFamily="34" charset="0"/>
+                        <a:cs typeface="Times New Roman" panose="02020603050405020304" pitchFamily="18" charset="0"/>
+                      </a:rPr>
+                      <m:t>=</m:t>
+                    </m:r>
+                    <m:r>
+                      <a:rPr lang="fr-FR" sz="2000" b="1" i="1">
+                        <a:effectLst/>
+                        <a:latin typeface="Cambria Math" panose="02040503050406030204" pitchFamily="18" charset="0"/>
+                        <a:ea typeface="Calibri" panose="020F0502020204030204" pitchFamily="34" charset="0"/>
+                        <a:cs typeface="Times New Roman" panose="02020603050405020304" pitchFamily="18" charset="0"/>
+                      </a:rPr>
+                      <m:t>𝐄</m:t>
+                    </m:r>
+                    <m:r>
+                      <a:rPr lang="fr-FR" sz="2000" i="1">
+                        <a:effectLst/>
+                        <a:latin typeface="Cambria Math" panose="02040503050406030204" pitchFamily="18" charset="0"/>
+                        <a:ea typeface="Calibri" panose="020F0502020204030204" pitchFamily="34" charset="0"/>
+                        <a:cs typeface="Times New Roman" panose="02020603050405020304" pitchFamily="18" charset="0"/>
+                      </a:rPr>
+                      <m:t>(</m:t>
+                    </m:r>
+                    <m:sSub>
+                      <m:sSubPr>
+                        <m:ctrlPr>
+                          <a:rPr lang="fr-FR" sz="2800" i="1">
+                            <a:effectLst/>
+                            <a:latin typeface="Cambria Math" panose="02040503050406030204" pitchFamily="18" charset="0"/>
+                          </a:rPr>
+                        </m:ctrlPr>
+                      </m:sSubPr>
+                      <m:e>
+                        <m:r>
+                          <a:rPr lang="fr-FR" sz="2000" b="1" i="1">
+                            <a:effectLst/>
+                            <a:latin typeface="Cambria Math" panose="02040503050406030204" pitchFamily="18" charset="0"/>
+                            <a:ea typeface="Calibri" panose="020F0502020204030204" pitchFamily="34" charset="0"/>
+                            <a:cs typeface="Times New Roman" panose="02020603050405020304" pitchFamily="18" charset="0"/>
+                          </a:rPr>
+                          <m:t>𝐬</m:t>
+                        </m:r>
+                      </m:e>
+                      <m:sub>
+                        <m:r>
+                          <a:rPr lang="fr-FR" sz="2000" i="1">
+                            <a:effectLst/>
+                            <a:latin typeface="Cambria Math" panose="02040503050406030204" pitchFamily="18" charset="0"/>
+                            <a:ea typeface="Calibri" panose="020F0502020204030204" pitchFamily="34" charset="0"/>
+                            <a:cs typeface="Times New Roman" panose="02020603050405020304" pitchFamily="18" charset="0"/>
+                          </a:rPr>
+                          <m:t>0</m:t>
+                        </m:r>
+                      </m:sub>
+                    </m:sSub>
+                    <m:r>
+                      <a:rPr lang="fr-FR" sz="2000" i="1">
+                        <a:effectLst/>
+                        <a:latin typeface="Cambria Math" panose="02040503050406030204" pitchFamily="18" charset="0"/>
+                        <a:ea typeface="Calibri" panose="020F0502020204030204" pitchFamily="34" charset="0"/>
+                        <a:cs typeface="Times New Roman" panose="02020603050405020304" pitchFamily="18" charset="0"/>
+                      </a:rPr>
+                      <m:t>∗</m:t>
+                    </m:r>
+                    <m:sSubSup>
+                      <m:sSubSupPr>
+                        <m:ctrlPr>
+                          <a:rPr lang="fr-FR" sz="2800" i="1">
+                            <a:effectLst/>
+                            <a:latin typeface="Cambria Math" panose="02040503050406030204" pitchFamily="18" charset="0"/>
+                          </a:rPr>
+                        </m:ctrlPr>
+                      </m:sSubSupPr>
+                      <m:e>
+                        <m:r>
+                          <a:rPr lang="fr-FR" sz="2000" b="1" i="1">
+                            <a:effectLst/>
+                            <a:latin typeface="Cambria Math" panose="02040503050406030204" pitchFamily="18" charset="0"/>
+                            <a:ea typeface="Calibri" panose="020F0502020204030204" pitchFamily="34" charset="0"/>
+                            <a:cs typeface="Times New Roman" panose="02020603050405020304" pitchFamily="18" charset="0"/>
+                          </a:rPr>
+                          <m:t>𝐬</m:t>
+                        </m:r>
+                      </m:e>
+                      <m:sub>
+                        <m:r>
+                          <a:rPr lang="fr-FR" sz="2000" i="1">
+                            <a:effectLst/>
+                            <a:latin typeface="Cambria Math" panose="02040503050406030204" pitchFamily="18" charset="0"/>
+                            <a:ea typeface="Calibri" panose="020F0502020204030204" pitchFamily="34" charset="0"/>
+                            <a:cs typeface="Times New Roman" panose="02020603050405020304" pitchFamily="18" charset="0"/>
+                          </a:rPr>
+                          <m:t>0</m:t>
+                        </m:r>
+                      </m:sub>
+                      <m:sup>
+                        <m:r>
+                          <a:rPr lang="fr-FR" sz="2000" i="1">
+                            <a:effectLst/>
+                            <a:latin typeface="Cambria Math" panose="02040503050406030204" pitchFamily="18" charset="0"/>
+                            <a:ea typeface="Calibri" panose="020F0502020204030204" pitchFamily="34" charset="0"/>
+                            <a:cs typeface="Times New Roman" panose="02020603050405020304" pitchFamily="18" charset="0"/>
+                          </a:rPr>
+                          <m:t>𝑡</m:t>
+                        </m:r>
+                      </m:sup>
+                    </m:sSubSup>
+                    <m:r>
+                      <a:rPr lang="fr-FR" sz="2000" i="1">
+                        <a:effectLst/>
+                        <a:latin typeface="Cambria Math" panose="02040503050406030204" pitchFamily="18" charset="0"/>
+                        <a:ea typeface="Calibri" panose="020F0502020204030204" pitchFamily="34" charset="0"/>
+                        <a:cs typeface="Times New Roman" panose="02020603050405020304" pitchFamily="18" charset="0"/>
+                      </a:rPr>
+                      <m:t>)</m:t>
+                    </m:r>
+                  </m:oMath>
+                </a14:m>
+                <a:endParaRPr lang="fr-FR" dirty="0"/>
+              </a:p>
+            </p:txBody>
+          </p:sp>
+        </mc:Choice>
+        <mc:Fallback>
+          <p:sp>
+            <p:nvSpPr>
+              <p:cNvPr id="4" name="Espace réservé du contenu 3">
+                <a:extLst>
+                  <a:ext uri="{FF2B5EF4-FFF2-40B4-BE49-F238E27FC236}">
+                    <a16:creationId xmlns:a16="http://schemas.microsoft.com/office/drawing/2014/main" id="{2E8CAD63-5268-433B-BE81-6BD3D30E6389}"/>
+                  </a:ext>
+                </a:extLst>
+              </p:cNvPr>
+              <p:cNvSpPr>
+                <a:spLocks noGrp="1" noRot="1" noChangeAspect="1" noMove="1" noResize="1" noEditPoints="1" noAdjustHandles="1" noChangeArrowheads="1" noChangeShapeType="1" noTextEdit="1"/>
+              </p:cNvSpPr>
+              <p:nvPr>
+                <p:ph sz="half" idx="2"/>
+              </p:nvPr>
+            </p:nvSpPr>
+            <p:spPr>
+              <a:blipFill>
+                <a:blip r:embed="rId3"/>
+                <a:stretch>
+                  <a:fillRect l="-2326" t="-3704"/>
+                </a:stretch>
+              </a:blipFill>
+            </p:spPr>
+            <p:txBody>
+              <a:bodyPr/>
+              <a:lstStyle/>
+              <a:p>
+                <a:r>
+                  <a:rPr lang="fr-FR">
+                    <a:noFill/>
+                  </a:rPr>
+                  <a:t> </a:t>
+                </a:r>
+              </a:p>
+            </p:txBody>
+          </p:sp>
+        </mc:Fallback>
+      </mc:AlternateContent>
+      <p:cxnSp>
+        <p:nvCxnSpPr>
+          <p:cNvPr id="29" name="Connecteur en arc 10">
+            <a:extLst>
+              <a:ext uri="{FF2B5EF4-FFF2-40B4-BE49-F238E27FC236}">
+                <a16:creationId xmlns:a16="http://schemas.microsoft.com/office/drawing/2014/main" id="{05E71057-7FA5-4407-8D85-961363E976AB}"/>
+              </a:ext>
+            </a:extLst>
+          </p:cNvPr>
+          <p:cNvCxnSpPr>
+            <a:cxnSpLocks/>
+          </p:cNvCxnSpPr>
+          <p:nvPr/>
+        </p:nvCxnSpPr>
+        <p:spPr>
+          <a:xfrm rot="5400000" flipH="1" flipV="1">
+            <a:off x="5198775" y="3829879"/>
+            <a:ext cx="1959047" cy="785812"/>
+          </a:xfrm>
+          <a:prstGeom prst="curvedConnector2">
+            <a:avLst/>
+          </a:prstGeom>
+          <a:ln>
+            <a:tailEnd type="triangle"/>
+          </a:ln>
+        </p:spPr>
+        <p:style>
+          <a:lnRef idx="1">
+            <a:schemeClr val="dk1"/>
+          </a:lnRef>
+          <a:fillRef idx="0">
+            <a:schemeClr val="dk1"/>
+          </a:fillRef>
+          <a:effectRef idx="0">
+            <a:schemeClr val="dk1"/>
+          </a:effectRef>
+          <a:fontRef idx="minor">
+            <a:schemeClr val="tx1"/>
+          </a:fontRef>
+        </p:style>
+      </p:cxnSp>
+      <p:sp>
+        <p:nvSpPr>
+          <p:cNvPr id="30" name="ZoneTexte 29">
+            <a:extLst>
+              <a:ext uri="{FF2B5EF4-FFF2-40B4-BE49-F238E27FC236}">
+                <a16:creationId xmlns:a16="http://schemas.microsoft.com/office/drawing/2014/main" id="{B79E65F1-A1E7-4C7A-9985-D45F8DD298E7}"/>
+              </a:ext>
+            </a:extLst>
+          </p:cNvPr>
+          <p:cNvSpPr txBox="1"/>
+          <p:nvPr/>
+        </p:nvSpPr>
+        <p:spPr>
+          <a:xfrm>
+            <a:off x="6695090" y="2732690"/>
+            <a:ext cx="4046482" cy="1754326"/>
+          </a:xfrm>
+          <a:prstGeom prst="rect">
+            <a:avLst/>
+          </a:prstGeom>
+          <a:noFill/>
+        </p:spPr>
+        <p:txBody>
+          <a:bodyPr wrap="square" rtlCol="0">
+            <a:spAutoFit/>
+          </a:bodyPr>
+          <a:lstStyle/>
+          <a:p>
+            <a:pPr algn="l"/>
+            <a:r>
+              <a:rPr lang="fr-FR" b="0" i="0" dirty="0">
+                <a:solidFill>
+                  <a:srgbClr val="000000"/>
+                </a:solidFill>
+                <a:effectLst/>
+                <a:latin typeface="Garamond (Corps)"/>
+              </a:rPr>
+              <a:t>La structure de cette matrice dépend de plusieurs facteurs :</a:t>
+            </a:r>
+          </a:p>
+          <a:p>
+            <a:pPr algn="l"/>
+            <a:r>
+              <a:rPr lang="fr-FR" b="0" i="0" dirty="0">
+                <a:solidFill>
+                  <a:srgbClr val="000000"/>
+                </a:solidFill>
+                <a:effectLst/>
+                <a:latin typeface="Garamond (Corps)"/>
+              </a:rPr>
+              <a:t>- Il y a t'il du bruit ?</a:t>
+            </a:r>
+          </a:p>
+          <a:p>
+            <a:pPr algn="l"/>
+            <a:r>
+              <a:rPr lang="fr-FR" b="0" i="0" dirty="0">
+                <a:solidFill>
+                  <a:srgbClr val="000000"/>
+                </a:solidFill>
+                <a:effectLst/>
+                <a:latin typeface="Garamond (Corps)"/>
+              </a:rPr>
+              <a:t>- Les signaux composants s0 sont-ils corrélés ?</a:t>
+            </a:r>
+          </a:p>
+          <a:p>
+            <a:endParaRPr lang="fr-FR" dirty="0"/>
+          </a:p>
+        </p:txBody>
+      </p:sp>
+    </p:spTree>
+    <p:extLst>
+      <p:ext uri="{BB962C8B-B14F-4D97-AF65-F5344CB8AC3E}">
+        <p14:creationId xmlns:p14="http://schemas.microsoft.com/office/powerpoint/2010/main" val="3696952606"/>
+      </p:ext>
+    </p:extLst>
+  </p:cSld>
+  <p:clrMapOvr>
+    <a:masterClrMapping/>
+  </p:clrMapOvr>
+  <p:timing>
+    <p:tnLst>
+      <p:par>
+        <p:cTn id="1" dur="indefinite" restart="never" nodeType="tmRoot">
+          <p:childTnLst>
+            <p:seq concurrent="1" nextAc="seek">
+              <p:cTn id="2" dur="indefinite" nodeType="mainSeq">
+                <p:childTnLst>
+                  <p:par>
+                    <p:cTn id="3" fill="hold">
+                      <p:stCondLst>
+                        <p:cond delay="indefinite"/>
+                      </p:stCondLst>
+                      <p:childTnLst>
+                        <p:par>
+                          <p:cTn id="4" fill="hold">
+                            <p:stCondLst>
+                              <p:cond delay="0"/>
+                            </p:stCondLst>
+                            <p:childTnLst>
+                              <p:par>
+                                <p:cTn id="5" presetID="1" presetClass="entr" presetSubtype="0" fill="hold" nodeType="clickEffect">
+                                  <p:stCondLst>
+                                    <p:cond delay="0"/>
+                                  </p:stCondLst>
+                                  <p:childTnLst>
+                                    <p:set>
+                                      <p:cBhvr>
+                                        <p:cTn id="6" dur="1" fill="hold">
+                                          <p:stCondLst>
+                                            <p:cond delay="0"/>
+                                          </p:stCondLst>
+                                        </p:cTn>
+                                        <p:tgtEl>
+                                          <p:spTgt spid="29"/>
+                                        </p:tgtEl>
+                                        <p:attrNameLst>
+                                          <p:attrName>style.visibility</p:attrName>
+                                        </p:attrNameLst>
+                                      </p:cBhvr>
+                                      <p:to>
+                                        <p:strVal val="visible"/>
+                                      </p:to>
+                                    </p:set>
+                                  </p:childTnLst>
+                                </p:cTn>
+                              </p:par>
+                            </p:childTnLst>
+                          </p:cTn>
+                        </p:par>
+                      </p:childTnLst>
+                    </p:cTn>
+                  </p:par>
+                </p:childTnLst>
+              </p:cTn>
+              <p:prevCondLst>
+                <p:cond evt="onPrev" delay="0">
+                  <p:tgtEl>
+                    <p:sldTgt/>
+                  </p:tgtEl>
+                </p:cond>
+              </p:prevCondLst>
+              <p:nextCondLst>
+                <p:cond evt="onNext" delay="0">
+                  <p:tgtEl>
+                    <p:sldTgt/>
+                  </p:tgtEl>
+                </p:cond>
+              </p:nextCondLst>
+            </p:seq>
+          </p:childTnLst>
+        </p:cTn>
+      </p:par>
+    </p:tnLst>
+  </p:timing>
+</p:sld>
+</file>
+
+<file path=ppt/slides/slide16.xml><?xml version="1.0" encoding="utf-8"?>
+<p:sld xmlns:a="http://schemas.openxmlformats.org/drawingml/2006/main" xmlns:r="http://schemas.openxmlformats.org/officeDocument/2006/relationships" xmlns:p="http://schemas.openxmlformats.org/presentationml/2006/main">
+  <p:cSld>
+    <p:spTree>
+      <p:nvGrpSpPr>
+        <p:cNvPr id="1" name=""/>
+        <p:cNvGrpSpPr/>
+        <p:nvPr/>
+      </p:nvGrpSpPr>
+      <p:grpSpPr>
+        <a:xfrm>
+          <a:off x="0" y="0"/>
+          <a:ext cx="0" cy="0"/>
+          <a:chOff x="0" y="0"/>
+          <a:chExt cx="0" cy="0"/>
+        </a:xfrm>
+      </p:grpSpPr>
+      <p:sp>
+        <p:nvSpPr>
+          <p:cNvPr id="2" name="Titre 1">
+            <a:extLst>
+              <a:ext uri="{FF2B5EF4-FFF2-40B4-BE49-F238E27FC236}">
+                <a16:creationId xmlns:a16="http://schemas.microsoft.com/office/drawing/2014/main" id="{826D3F8B-B6A0-4AD4-B105-8C61E0790605}"/>
+              </a:ext>
+            </a:extLst>
+          </p:cNvPr>
+          <p:cNvSpPr>
+            <a:spLocks noGrp="1"/>
+          </p:cNvSpPr>
+          <p:nvPr>
+            <p:ph type="title"/>
+          </p:nvPr>
+        </p:nvSpPr>
+        <p:spPr/>
+        <p:txBody>
+          <a:bodyPr/>
+          <a:lstStyle/>
+          <a:p>
+            <a:r>
+              <a:rPr lang="fr-FR" dirty="0"/>
+              <a:t>Comparaison et conclusion</a:t>
+            </a:r>
+          </a:p>
+        </p:txBody>
+      </p:sp>
+      <p:pic>
+        <p:nvPicPr>
+          <p:cNvPr id="8" name="Espace réservé du contenu 7">
+            <a:extLst>
+              <a:ext uri="{FF2B5EF4-FFF2-40B4-BE49-F238E27FC236}">
+                <a16:creationId xmlns:a16="http://schemas.microsoft.com/office/drawing/2014/main" id="{DFD3E6AD-7174-4D73-8AB8-938F71D58996}"/>
+              </a:ext>
+            </a:extLst>
+          </p:cNvPr>
+          <p:cNvPicPr>
+            <a:picLocks noGrp="1" noChangeAspect="1"/>
+          </p:cNvPicPr>
+          <p:nvPr>
+            <p:ph sz="half" idx="2"/>
+          </p:nvPr>
+        </p:nvPicPr>
+        <p:blipFill>
+          <a:blip r:embed="rId3"/>
+          <a:stretch>
+            <a:fillRect/>
+          </a:stretch>
+        </p:blipFill>
+        <p:spPr>
+          <a:xfrm>
+            <a:off x="1295402" y="2613706"/>
+            <a:ext cx="4306817" cy="3239508"/>
+          </a:xfrm>
+        </p:spPr>
+      </p:pic>
+      <p:pic>
+        <p:nvPicPr>
+          <p:cNvPr id="10" name="Espace réservé du contenu 9">
+            <a:extLst>
+              <a:ext uri="{FF2B5EF4-FFF2-40B4-BE49-F238E27FC236}">
+                <a16:creationId xmlns:a16="http://schemas.microsoft.com/office/drawing/2014/main" id="{F536F632-7535-4866-AE8E-76B6E926901C}"/>
+              </a:ext>
+            </a:extLst>
+          </p:cNvPr>
+          <p:cNvPicPr>
+            <a:picLocks noGrp="1" noChangeAspect="1"/>
+          </p:cNvPicPr>
+          <p:nvPr>
+            <p:ph sz="quarter" idx="4"/>
+          </p:nvPr>
+        </p:nvPicPr>
+        <p:blipFill>
+          <a:blip r:embed="rId4"/>
+          <a:stretch>
+            <a:fillRect/>
+          </a:stretch>
+        </p:blipFill>
+        <p:spPr>
+          <a:xfrm>
+            <a:off x="6571974" y="2635831"/>
+            <a:ext cx="4324624" cy="3239508"/>
+          </a:xfrm>
+        </p:spPr>
+      </p:pic>
+    </p:spTree>
+    <p:extLst>
+      <p:ext uri="{BB962C8B-B14F-4D97-AF65-F5344CB8AC3E}">
+        <p14:creationId xmlns:p14="http://schemas.microsoft.com/office/powerpoint/2010/main" val="3464455683"/>
+      </p:ext>
+    </p:extLst>
+  </p:cSld>
+  <p:clrMapOvr>
+    <a:masterClrMapping/>
+  </p:clrMapOvr>
 </p:sld>
 </file>
 

</xml_diff>